<commit_message>
Minor changes for week 1
</commit_message>
<xml_diff>
--- a/Basic_python/1 Sequence.pptx
+++ b/Basic_python/1 Sequence.pptx
@@ -167,52 +167,37 @@
 </p:cmAuthorLst>
 </file>
 
-<file path=ppt/revisionInfo.xml><?xml version="1.0" encoding="utf-8"?>
-<p1510:revInfo xmlns:a="http://schemas.openxmlformats.org/drawingml/2006/main" xmlns:r="http://schemas.openxmlformats.org/officeDocument/2006/relationships" xmlns:p1510="http://schemas.microsoft.com/office/powerpoint/2015/10/main">
-  <p1510:revLst>
-    <p1510:client id="{3E5D4F97-4AF9-45BF-8D7E-DF2C95C8B6E7}" v="2" dt="2022-05-25T12:52:59.030"/>
-  </p1510:revLst>
-</p1510:revInfo>
-</file>
-
 <file path=ppt/changesInfos/changesInfo1.xml><?xml version="1.0" encoding="utf-8"?>
 <pc:chgInfo xmlns:a="http://schemas.openxmlformats.org/drawingml/2006/main" xmlns:r="http://schemas.openxmlformats.org/officeDocument/2006/relationships" xmlns:ac="http://schemas.microsoft.com/office/drawing/2013/main/command" xmlns:pc="http://schemas.microsoft.com/office/powerpoint/2013/main/command">
   <pc:docChgLst>
-    <pc:chgData name="Hans Bartholomeus" userId="fdad893c-ea0f-4e18-a760-ac9a83339ccd" providerId="ADAL" clId="{E1B84243-F818-443F-B3F9-94F107148CB2}"/>
+    <pc:chgData name="Ellen Torfs" userId="c6aa1e10-4a12-4511-8c7c-135720d4f277" providerId="ADAL" clId="{E4105CDD-61A8-4CD5-A206-FD70DE250DC6}"/>
     <pc:docChg chg="custSel modSld">
-      <pc:chgData name="Hans Bartholomeus" userId="fdad893c-ea0f-4e18-a760-ac9a83339ccd" providerId="ADAL" clId="{E1B84243-F818-443F-B3F9-94F107148CB2}" dt="2020-09-18T10:32:00.933" v="57" actId="478"/>
+      <pc:chgData name="Ellen Torfs" userId="c6aa1e10-4a12-4511-8c7c-135720d4f277" providerId="ADAL" clId="{E4105CDD-61A8-4CD5-A206-FD70DE250DC6}" dt="2021-09-06T11:46:51.654" v="4" actId="1076"/>
       <pc:docMkLst>
         <pc:docMk/>
       </pc:docMkLst>
-      <pc:sldChg chg="delSp mod">
-        <pc:chgData name="Hans Bartholomeus" userId="fdad893c-ea0f-4e18-a760-ac9a83339ccd" providerId="ADAL" clId="{E1B84243-F818-443F-B3F9-94F107148CB2}" dt="2020-09-18T10:32:00.933" v="57" actId="478"/>
+      <pc:sldChg chg="addSp delSp modSp mod">
+        <pc:chgData name="Ellen Torfs" userId="c6aa1e10-4a12-4511-8c7c-135720d4f277" providerId="ADAL" clId="{E4105CDD-61A8-4CD5-A206-FD70DE250DC6}" dt="2021-09-06T11:46:51.654" v="4" actId="1076"/>
         <pc:sldMkLst>
           <pc:docMk/>
-          <pc:sldMk cId="43088005" sldId="288"/>
+          <pc:sldMk cId="2708364635" sldId="276"/>
         </pc:sldMkLst>
-        <pc:spChg chg="del">
-          <ac:chgData name="Hans Bartholomeus" userId="fdad893c-ea0f-4e18-a760-ac9a83339ccd" providerId="ADAL" clId="{E1B84243-F818-443F-B3F9-94F107148CB2}" dt="2020-09-18T10:32:00.933" v="57" actId="478"/>
-          <ac:spMkLst>
+        <pc:picChg chg="del">
+          <ac:chgData name="Ellen Torfs" userId="c6aa1e10-4a12-4511-8c7c-135720d4f277" providerId="ADAL" clId="{E4105CDD-61A8-4CD5-A206-FD70DE250DC6}" dt="2021-09-06T11:46:26.302" v="0" actId="478"/>
+          <ac:picMkLst>
             <pc:docMk/>
-            <pc:sldMk cId="43088005" sldId="288"/>
-            <ac:spMk id="13" creationId="{00000000-0000-0000-0000-000000000000}"/>
-          </ac:spMkLst>
-        </pc:spChg>
-      </pc:sldChg>
-      <pc:sldChg chg="modSp mod">
-        <pc:chgData name="Hans Bartholomeus" userId="fdad893c-ea0f-4e18-a760-ac9a83339ccd" providerId="ADAL" clId="{E1B84243-F818-443F-B3F9-94F107148CB2}" dt="2020-09-18T09:40:46.915" v="56" actId="20577"/>
-        <pc:sldMkLst>
-          <pc:docMk/>
-          <pc:sldMk cId="2208920561" sldId="306"/>
-        </pc:sldMkLst>
-        <pc:spChg chg="mod">
-          <ac:chgData name="Hans Bartholomeus" userId="fdad893c-ea0f-4e18-a760-ac9a83339ccd" providerId="ADAL" clId="{E1B84243-F818-443F-B3F9-94F107148CB2}" dt="2020-09-18T09:40:46.915" v="56" actId="20577"/>
-          <ac:spMkLst>
+            <pc:sldMk cId="2708364635" sldId="276"/>
+            <ac:picMk id="4" creationId="{44A795A1-52BF-4B85-BE19-FCA3053FDB32}"/>
+          </ac:picMkLst>
+        </pc:picChg>
+        <pc:picChg chg="add mod">
+          <ac:chgData name="Ellen Torfs" userId="c6aa1e10-4a12-4511-8c7c-135720d4f277" providerId="ADAL" clId="{E4105CDD-61A8-4CD5-A206-FD70DE250DC6}" dt="2021-09-06T11:46:51.654" v="4" actId="1076"/>
+          <ac:picMkLst>
             <pc:docMk/>
-            <pc:sldMk cId="2208920561" sldId="306"/>
-            <ac:spMk id="3" creationId="{00000000-0000-0000-0000-000000000000}"/>
-          </ac:spMkLst>
-        </pc:spChg>
+            <pc:sldMk cId="2708364635" sldId="276"/>
+            <ac:picMk id="7" creationId="{8B6F94DA-AA0E-4229-8730-F1389E7C669E}"/>
+          </ac:picMkLst>
+        </pc:picChg>
       </pc:sldChg>
     </pc:docChg>
   </pc:docChgLst>
@@ -2376,856 +2361,6 @@
     </pc:docChg>
   </pc:docChgLst>
   <pc:docChgLst>
-    <pc:chgData name="Christel Maes" userId="7e61469a-7c21-464c-bace-a1bda262211a" providerId="ADAL" clId="{EB65D1DE-64AF-4D16-995F-1B7EFD43A975}"/>
-    <pc:docChg chg="modSld">
-      <pc:chgData name="Christel Maes" userId="7e61469a-7c21-464c-bace-a1bda262211a" providerId="ADAL" clId="{EB65D1DE-64AF-4D16-995F-1B7EFD43A975}" dt="2020-09-10T15:18:20.751" v="0"/>
-      <pc:docMkLst>
-        <pc:docMk/>
-      </pc:docMkLst>
-      <pc:sldChg chg="delSp modAnim">
-        <pc:chgData name="Christel Maes" userId="7e61469a-7c21-464c-bace-a1bda262211a" providerId="ADAL" clId="{EB65D1DE-64AF-4D16-995F-1B7EFD43A975}" dt="2020-09-10T15:18:20.751" v="0"/>
-        <pc:sldMkLst>
-          <pc:docMk/>
-          <pc:sldMk cId="112707644" sldId="266"/>
-        </pc:sldMkLst>
-        <pc:picChg chg="del">
-          <ac:chgData name="Christel Maes" userId="7e61469a-7c21-464c-bace-a1bda262211a" providerId="ADAL" clId="{EB65D1DE-64AF-4D16-995F-1B7EFD43A975}" dt="2020-09-10T15:18:20.751" v="0"/>
-          <ac:picMkLst>
-            <pc:docMk/>
-            <pc:sldMk cId="112707644" sldId="266"/>
-            <ac:picMk id="8" creationId="{28E567BE-D71B-4437-9EA6-A8A3E49B534E}"/>
-          </ac:picMkLst>
-        </pc:picChg>
-      </pc:sldChg>
-      <pc:sldChg chg="delSp modAnim">
-        <pc:chgData name="Christel Maes" userId="7e61469a-7c21-464c-bace-a1bda262211a" providerId="ADAL" clId="{EB65D1DE-64AF-4D16-995F-1B7EFD43A975}" dt="2020-09-10T15:18:20.751" v="0"/>
-        <pc:sldMkLst>
-          <pc:docMk/>
-          <pc:sldMk cId="2667205004" sldId="269"/>
-        </pc:sldMkLst>
-        <pc:picChg chg="del">
-          <ac:chgData name="Christel Maes" userId="7e61469a-7c21-464c-bace-a1bda262211a" providerId="ADAL" clId="{EB65D1DE-64AF-4D16-995F-1B7EFD43A975}" dt="2020-09-10T15:18:20.751" v="0"/>
-          <ac:picMkLst>
-            <pc:docMk/>
-            <pc:sldMk cId="2667205004" sldId="269"/>
-            <ac:picMk id="4" creationId="{EBBCA4D5-DBC8-4F13-AAE5-1F8250E55044}"/>
-          </ac:picMkLst>
-        </pc:picChg>
-      </pc:sldChg>
-      <pc:sldChg chg="delSp modAnim">
-        <pc:chgData name="Christel Maes" userId="7e61469a-7c21-464c-bace-a1bda262211a" providerId="ADAL" clId="{EB65D1DE-64AF-4D16-995F-1B7EFD43A975}" dt="2020-09-10T15:18:20.751" v="0"/>
-        <pc:sldMkLst>
-          <pc:docMk/>
-          <pc:sldMk cId="2718411288" sldId="270"/>
-        </pc:sldMkLst>
-        <pc:picChg chg="del">
-          <ac:chgData name="Christel Maes" userId="7e61469a-7c21-464c-bace-a1bda262211a" providerId="ADAL" clId="{EB65D1DE-64AF-4D16-995F-1B7EFD43A975}" dt="2020-09-10T15:18:20.751" v="0"/>
-          <ac:picMkLst>
-            <pc:docMk/>
-            <pc:sldMk cId="2718411288" sldId="270"/>
-            <ac:picMk id="5" creationId="{C110C81C-F461-4773-9E2D-3E67C3A0A056}"/>
-          </ac:picMkLst>
-        </pc:picChg>
-      </pc:sldChg>
-      <pc:sldChg chg="delSp modAnim">
-        <pc:chgData name="Christel Maes" userId="7e61469a-7c21-464c-bace-a1bda262211a" providerId="ADAL" clId="{EB65D1DE-64AF-4D16-995F-1B7EFD43A975}" dt="2020-09-10T15:18:20.751" v="0"/>
-        <pc:sldMkLst>
-          <pc:docMk/>
-          <pc:sldMk cId="523898943" sldId="271"/>
-        </pc:sldMkLst>
-        <pc:picChg chg="del">
-          <ac:chgData name="Christel Maes" userId="7e61469a-7c21-464c-bace-a1bda262211a" providerId="ADAL" clId="{EB65D1DE-64AF-4D16-995F-1B7EFD43A975}" dt="2020-09-10T15:18:20.751" v="0"/>
-          <ac:picMkLst>
-            <pc:docMk/>
-            <pc:sldMk cId="523898943" sldId="271"/>
-            <ac:picMk id="2" creationId="{FB4EBBEF-CF96-41D0-8246-94F6941B7768}"/>
-          </ac:picMkLst>
-        </pc:picChg>
-      </pc:sldChg>
-      <pc:sldChg chg="delSp modAnim">
-        <pc:chgData name="Christel Maes" userId="7e61469a-7c21-464c-bace-a1bda262211a" providerId="ADAL" clId="{EB65D1DE-64AF-4D16-995F-1B7EFD43A975}" dt="2020-09-10T15:18:20.751" v="0"/>
-        <pc:sldMkLst>
-          <pc:docMk/>
-          <pc:sldMk cId="448105480" sldId="272"/>
-        </pc:sldMkLst>
-        <pc:picChg chg="del">
-          <ac:chgData name="Christel Maes" userId="7e61469a-7c21-464c-bace-a1bda262211a" providerId="ADAL" clId="{EB65D1DE-64AF-4D16-995F-1B7EFD43A975}" dt="2020-09-10T15:18:20.751" v="0"/>
-          <ac:picMkLst>
-            <pc:docMk/>
-            <pc:sldMk cId="448105480" sldId="272"/>
-            <ac:picMk id="7" creationId="{768A3B87-A4EE-4DCD-9F03-A1A2F2A0E3A0}"/>
-          </ac:picMkLst>
-        </pc:picChg>
-      </pc:sldChg>
-      <pc:sldChg chg="delSp modAnim">
-        <pc:chgData name="Christel Maes" userId="7e61469a-7c21-464c-bace-a1bda262211a" providerId="ADAL" clId="{EB65D1DE-64AF-4D16-995F-1B7EFD43A975}" dt="2020-09-10T15:18:20.751" v="0"/>
-        <pc:sldMkLst>
-          <pc:docMk/>
-          <pc:sldMk cId="2442765326" sldId="273"/>
-        </pc:sldMkLst>
-        <pc:picChg chg="del">
-          <ac:chgData name="Christel Maes" userId="7e61469a-7c21-464c-bace-a1bda262211a" providerId="ADAL" clId="{EB65D1DE-64AF-4D16-995F-1B7EFD43A975}" dt="2020-09-10T15:18:20.751" v="0"/>
-          <ac:picMkLst>
-            <pc:docMk/>
-            <pc:sldMk cId="2442765326" sldId="273"/>
-            <ac:picMk id="6" creationId="{57638C34-8A6A-4254-A7A9-56BE957AF80A}"/>
-          </ac:picMkLst>
-        </pc:picChg>
-      </pc:sldChg>
-      <pc:sldChg chg="delSp modAnim">
-        <pc:chgData name="Christel Maes" userId="7e61469a-7c21-464c-bace-a1bda262211a" providerId="ADAL" clId="{EB65D1DE-64AF-4D16-995F-1B7EFD43A975}" dt="2020-09-10T15:18:20.751" v="0"/>
-        <pc:sldMkLst>
-          <pc:docMk/>
-          <pc:sldMk cId="1505779418" sldId="274"/>
-        </pc:sldMkLst>
-        <pc:picChg chg="del">
-          <ac:chgData name="Christel Maes" userId="7e61469a-7c21-464c-bace-a1bda262211a" providerId="ADAL" clId="{EB65D1DE-64AF-4D16-995F-1B7EFD43A975}" dt="2020-09-10T15:18:20.751" v="0"/>
-          <ac:picMkLst>
-            <pc:docMk/>
-            <pc:sldMk cId="1505779418" sldId="274"/>
-            <ac:picMk id="4" creationId="{97E51C7C-797A-42D4-BEB1-3F78376AFFD1}"/>
-          </ac:picMkLst>
-        </pc:picChg>
-      </pc:sldChg>
-      <pc:sldChg chg="delSp modAnim">
-        <pc:chgData name="Christel Maes" userId="7e61469a-7c21-464c-bace-a1bda262211a" providerId="ADAL" clId="{EB65D1DE-64AF-4D16-995F-1B7EFD43A975}" dt="2020-09-10T15:18:20.751" v="0"/>
-        <pc:sldMkLst>
-          <pc:docMk/>
-          <pc:sldMk cId="399813621" sldId="275"/>
-        </pc:sldMkLst>
-        <pc:picChg chg="del">
-          <ac:chgData name="Christel Maes" userId="7e61469a-7c21-464c-bace-a1bda262211a" providerId="ADAL" clId="{EB65D1DE-64AF-4D16-995F-1B7EFD43A975}" dt="2020-09-10T15:18:20.751" v="0"/>
-          <ac:picMkLst>
-            <pc:docMk/>
-            <pc:sldMk cId="399813621" sldId="275"/>
-            <ac:picMk id="7" creationId="{756585F3-E659-457C-86B8-3029F0898B38}"/>
-          </ac:picMkLst>
-        </pc:picChg>
-      </pc:sldChg>
-      <pc:sldChg chg="delSp modAnim">
-        <pc:chgData name="Christel Maes" userId="7e61469a-7c21-464c-bace-a1bda262211a" providerId="ADAL" clId="{EB65D1DE-64AF-4D16-995F-1B7EFD43A975}" dt="2020-09-10T15:18:20.751" v="0"/>
-        <pc:sldMkLst>
-          <pc:docMk/>
-          <pc:sldMk cId="2708364635" sldId="276"/>
-        </pc:sldMkLst>
-        <pc:picChg chg="del">
-          <ac:chgData name="Christel Maes" userId="7e61469a-7c21-464c-bace-a1bda262211a" providerId="ADAL" clId="{EB65D1DE-64AF-4D16-995F-1B7EFD43A975}" dt="2020-09-10T15:18:20.751" v="0"/>
-          <ac:picMkLst>
-            <pc:docMk/>
-            <pc:sldMk cId="2708364635" sldId="276"/>
-            <ac:picMk id="6" creationId="{4CF3C8E1-A671-4C5F-924C-FD13B6D1F646}"/>
-          </ac:picMkLst>
-        </pc:picChg>
-      </pc:sldChg>
-      <pc:sldChg chg="delSp modAnim">
-        <pc:chgData name="Christel Maes" userId="7e61469a-7c21-464c-bace-a1bda262211a" providerId="ADAL" clId="{EB65D1DE-64AF-4D16-995F-1B7EFD43A975}" dt="2020-09-10T15:18:20.751" v="0"/>
-        <pc:sldMkLst>
-          <pc:docMk/>
-          <pc:sldMk cId="937416680" sldId="277"/>
-        </pc:sldMkLst>
-        <pc:picChg chg="del">
-          <ac:chgData name="Christel Maes" userId="7e61469a-7c21-464c-bace-a1bda262211a" providerId="ADAL" clId="{EB65D1DE-64AF-4D16-995F-1B7EFD43A975}" dt="2020-09-10T15:18:20.751" v="0"/>
-          <ac:picMkLst>
-            <pc:docMk/>
-            <pc:sldMk cId="937416680" sldId="277"/>
-            <ac:picMk id="4" creationId="{03F366B2-79B4-43B5-85FB-5FEDF29DE966}"/>
-          </ac:picMkLst>
-        </pc:picChg>
-      </pc:sldChg>
-      <pc:sldChg chg="delSp modAnim">
-        <pc:chgData name="Christel Maes" userId="7e61469a-7c21-464c-bace-a1bda262211a" providerId="ADAL" clId="{EB65D1DE-64AF-4D16-995F-1B7EFD43A975}" dt="2020-09-10T15:18:20.751" v="0"/>
-        <pc:sldMkLst>
-          <pc:docMk/>
-          <pc:sldMk cId="2442208220" sldId="278"/>
-        </pc:sldMkLst>
-        <pc:picChg chg="del">
-          <ac:chgData name="Christel Maes" userId="7e61469a-7c21-464c-bace-a1bda262211a" providerId="ADAL" clId="{EB65D1DE-64AF-4D16-995F-1B7EFD43A975}" dt="2020-09-10T15:18:20.751" v="0"/>
-          <ac:picMkLst>
-            <pc:docMk/>
-            <pc:sldMk cId="2442208220" sldId="278"/>
-            <ac:picMk id="12" creationId="{76FC78D4-D9C4-4BD5-9100-1A00826A40D3}"/>
-          </ac:picMkLst>
-        </pc:picChg>
-      </pc:sldChg>
-      <pc:sldChg chg="delSp modAnim">
-        <pc:chgData name="Christel Maes" userId="7e61469a-7c21-464c-bace-a1bda262211a" providerId="ADAL" clId="{EB65D1DE-64AF-4D16-995F-1B7EFD43A975}" dt="2020-09-10T15:18:20.751" v="0"/>
-        <pc:sldMkLst>
-          <pc:docMk/>
-          <pc:sldMk cId="3473159973" sldId="279"/>
-        </pc:sldMkLst>
-        <pc:picChg chg="del">
-          <ac:chgData name="Christel Maes" userId="7e61469a-7c21-464c-bace-a1bda262211a" providerId="ADAL" clId="{EB65D1DE-64AF-4D16-995F-1B7EFD43A975}" dt="2020-09-10T15:18:20.751" v="0"/>
-          <ac:picMkLst>
-            <pc:docMk/>
-            <pc:sldMk cId="3473159973" sldId="279"/>
-            <ac:picMk id="6" creationId="{A3036D6F-D405-4C89-B943-1350615B0DE5}"/>
-          </ac:picMkLst>
-        </pc:picChg>
-      </pc:sldChg>
-      <pc:sldChg chg="delSp modAnim">
-        <pc:chgData name="Christel Maes" userId="7e61469a-7c21-464c-bace-a1bda262211a" providerId="ADAL" clId="{EB65D1DE-64AF-4D16-995F-1B7EFD43A975}" dt="2020-09-10T15:18:20.751" v="0"/>
-        <pc:sldMkLst>
-          <pc:docMk/>
-          <pc:sldMk cId="3707028608" sldId="280"/>
-        </pc:sldMkLst>
-        <pc:picChg chg="del">
-          <ac:chgData name="Christel Maes" userId="7e61469a-7c21-464c-bace-a1bda262211a" providerId="ADAL" clId="{EB65D1DE-64AF-4D16-995F-1B7EFD43A975}" dt="2020-09-10T15:18:20.751" v="0"/>
-          <ac:picMkLst>
-            <pc:docMk/>
-            <pc:sldMk cId="3707028608" sldId="280"/>
-            <ac:picMk id="9" creationId="{6986EE8F-0CE8-45FD-8FCE-06760C4C47A2}"/>
-          </ac:picMkLst>
-        </pc:picChg>
-      </pc:sldChg>
-      <pc:sldChg chg="delSp modAnim">
-        <pc:chgData name="Christel Maes" userId="7e61469a-7c21-464c-bace-a1bda262211a" providerId="ADAL" clId="{EB65D1DE-64AF-4D16-995F-1B7EFD43A975}" dt="2020-09-10T15:18:20.751" v="0"/>
-        <pc:sldMkLst>
-          <pc:docMk/>
-          <pc:sldMk cId="2497475297" sldId="281"/>
-        </pc:sldMkLst>
-        <pc:picChg chg="del">
-          <ac:chgData name="Christel Maes" userId="7e61469a-7c21-464c-bace-a1bda262211a" providerId="ADAL" clId="{EB65D1DE-64AF-4D16-995F-1B7EFD43A975}" dt="2020-09-10T15:18:20.751" v="0"/>
-          <ac:picMkLst>
-            <pc:docMk/>
-            <pc:sldMk cId="2497475297" sldId="281"/>
-            <ac:picMk id="14" creationId="{2291C51A-B2B3-42BF-88D3-AA49FB9B7D1B}"/>
-          </ac:picMkLst>
-        </pc:picChg>
-      </pc:sldChg>
-      <pc:sldChg chg="delSp modAnim">
-        <pc:chgData name="Christel Maes" userId="7e61469a-7c21-464c-bace-a1bda262211a" providerId="ADAL" clId="{EB65D1DE-64AF-4D16-995F-1B7EFD43A975}" dt="2020-09-10T15:18:20.751" v="0"/>
-        <pc:sldMkLst>
-          <pc:docMk/>
-          <pc:sldMk cId="580256068" sldId="282"/>
-        </pc:sldMkLst>
-        <pc:picChg chg="del">
-          <ac:chgData name="Christel Maes" userId="7e61469a-7c21-464c-bace-a1bda262211a" providerId="ADAL" clId="{EB65D1DE-64AF-4D16-995F-1B7EFD43A975}" dt="2020-09-10T15:18:20.751" v="0"/>
-          <ac:picMkLst>
-            <pc:docMk/>
-            <pc:sldMk cId="580256068" sldId="282"/>
-            <ac:picMk id="4" creationId="{33ABBEF8-7366-4074-B8D1-6BCCB892F57E}"/>
-          </ac:picMkLst>
-        </pc:picChg>
-      </pc:sldChg>
-      <pc:sldChg chg="delSp modAnim">
-        <pc:chgData name="Christel Maes" userId="7e61469a-7c21-464c-bace-a1bda262211a" providerId="ADAL" clId="{EB65D1DE-64AF-4D16-995F-1B7EFD43A975}" dt="2020-09-10T15:18:20.751" v="0"/>
-        <pc:sldMkLst>
-          <pc:docMk/>
-          <pc:sldMk cId="4167317431" sldId="283"/>
-        </pc:sldMkLst>
-        <pc:picChg chg="del">
-          <ac:chgData name="Christel Maes" userId="7e61469a-7c21-464c-bace-a1bda262211a" providerId="ADAL" clId="{EB65D1DE-64AF-4D16-995F-1B7EFD43A975}" dt="2020-09-10T15:18:20.751" v="0"/>
-          <ac:picMkLst>
-            <pc:docMk/>
-            <pc:sldMk cId="4167317431" sldId="283"/>
-            <ac:picMk id="5" creationId="{20802149-9955-40B5-B1E8-AE673E849DAF}"/>
-          </ac:picMkLst>
-        </pc:picChg>
-      </pc:sldChg>
-      <pc:sldChg chg="delSp modAnim">
-        <pc:chgData name="Christel Maes" userId="7e61469a-7c21-464c-bace-a1bda262211a" providerId="ADAL" clId="{EB65D1DE-64AF-4D16-995F-1B7EFD43A975}" dt="2020-09-10T15:18:20.751" v="0"/>
-        <pc:sldMkLst>
-          <pc:docMk/>
-          <pc:sldMk cId="76180516" sldId="284"/>
-        </pc:sldMkLst>
-        <pc:picChg chg="del">
-          <ac:chgData name="Christel Maes" userId="7e61469a-7c21-464c-bace-a1bda262211a" providerId="ADAL" clId="{EB65D1DE-64AF-4D16-995F-1B7EFD43A975}" dt="2020-09-10T15:18:20.751" v="0"/>
-          <ac:picMkLst>
-            <pc:docMk/>
-            <pc:sldMk cId="76180516" sldId="284"/>
-            <ac:picMk id="4" creationId="{A560FBB7-8DE9-495E-A9F3-B55CDA3E9642}"/>
-          </ac:picMkLst>
-        </pc:picChg>
-      </pc:sldChg>
-      <pc:sldChg chg="delSp modAnim">
-        <pc:chgData name="Christel Maes" userId="7e61469a-7c21-464c-bace-a1bda262211a" providerId="ADAL" clId="{EB65D1DE-64AF-4D16-995F-1B7EFD43A975}" dt="2020-09-10T15:18:20.751" v="0"/>
-        <pc:sldMkLst>
-          <pc:docMk/>
-          <pc:sldMk cId="59728421" sldId="285"/>
-        </pc:sldMkLst>
-        <pc:picChg chg="del">
-          <ac:chgData name="Christel Maes" userId="7e61469a-7c21-464c-bace-a1bda262211a" providerId="ADAL" clId="{EB65D1DE-64AF-4D16-995F-1B7EFD43A975}" dt="2020-09-10T15:18:20.751" v="0"/>
-          <ac:picMkLst>
-            <pc:docMk/>
-            <pc:sldMk cId="59728421" sldId="285"/>
-            <ac:picMk id="5" creationId="{61CFACFB-91B7-427D-96E3-A0E5C1BC614C}"/>
-          </ac:picMkLst>
-        </pc:picChg>
-      </pc:sldChg>
-      <pc:sldChg chg="delSp modAnim">
-        <pc:chgData name="Christel Maes" userId="7e61469a-7c21-464c-bace-a1bda262211a" providerId="ADAL" clId="{EB65D1DE-64AF-4D16-995F-1B7EFD43A975}" dt="2020-09-10T15:18:20.751" v="0"/>
-        <pc:sldMkLst>
-          <pc:docMk/>
-          <pc:sldMk cId="4200910606" sldId="286"/>
-        </pc:sldMkLst>
-        <pc:picChg chg="del">
-          <ac:chgData name="Christel Maes" userId="7e61469a-7c21-464c-bace-a1bda262211a" providerId="ADAL" clId="{EB65D1DE-64AF-4D16-995F-1B7EFD43A975}" dt="2020-09-10T15:18:20.751" v="0"/>
-          <ac:picMkLst>
-            <pc:docMk/>
-            <pc:sldMk cId="4200910606" sldId="286"/>
-            <ac:picMk id="4" creationId="{836E1F73-F995-4187-9C96-B9C57F95F24D}"/>
-          </ac:picMkLst>
-        </pc:picChg>
-      </pc:sldChg>
-      <pc:sldChg chg="delSp modAnim">
-        <pc:chgData name="Christel Maes" userId="7e61469a-7c21-464c-bace-a1bda262211a" providerId="ADAL" clId="{EB65D1DE-64AF-4D16-995F-1B7EFD43A975}" dt="2020-09-10T15:18:20.751" v="0"/>
-        <pc:sldMkLst>
-          <pc:docMk/>
-          <pc:sldMk cId="4009331374" sldId="287"/>
-        </pc:sldMkLst>
-        <pc:picChg chg="del">
-          <ac:chgData name="Christel Maes" userId="7e61469a-7c21-464c-bace-a1bda262211a" providerId="ADAL" clId="{EB65D1DE-64AF-4D16-995F-1B7EFD43A975}" dt="2020-09-10T15:18:20.751" v="0"/>
-          <ac:picMkLst>
-            <pc:docMk/>
-            <pc:sldMk cId="4009331374" sldId="287"/>
-            <ac:picMk id="6" creationId="{E4AB014E-6230-4398-A738-301FCC8C9508}"/>
-          </ac:picMkLst>
-        </pc:picChg>
-      </pc:sldChg>
-      <pc:sldChg chg="delSp modAnim">
-        <pc:chgData name="Christel Maes" userId="7e61469a-7c21-464c-bace-a1bda262211a" providerId="ADAL" clId="{EB65D1DE-64AF-4D16-995F-1B7EFD43A975}" dt="2020-09-10T15:18:20.751" v="0"/>
-        <pc:sldMkLst>
-          <pc:docMk/>
-          <pc:sldMk cId="43088005" sldId="288"/>
-        </pc:sldMkLst>
-        <pc:picChg chg="del">
-          <ac:chgData name="Christel Maes" userId="7e61469a-7c21-464c-bace-a1bda262211a" providerId="ADAL" clId="{EB65D1DE-64AF-4D16-995F-1B7EFD43A975}" dt="2020-09-10T15:18:20.751" v="0"/>
-          <ac:picMkLst>
-            <pc:docMk/>
-            <pc:sldMk cId="43088005" sldId="288"/>
-            <ac:picMk id="4" creationId="{32CDA107-55C4-4228-AB6C-3C22F7EE869B}"/>
-          </ac:picMkLst>
-        </pc:picChg>
-      </pc:sldChg>
-      <pc:sldChg chg="delSp modAnim">
-        <pc:chgData name="Christel Maes" userId="7e61469a-7c21-464c-bace-a1bda262211a" providerId="ADAL" clId="{EB65D1DE-64AF-4D16-995F-1B7EFD43A975}" dt="2020-09-10T15:18:20.751" v="0"/>
-        <pc:sldMkLst>
-          <pc:docMk/>
-          <pc:sldMk cId="1022641883" sldId="289"/>
-        </pc:sldMkLst>
-        <pc:picChg chg="del">
-          <ac:chgData name="Christel Maes" userId="7e61469a-7c21-464c-bace-a1bda262211a" providerId="ADAL" clId="{EB65D1DE-64AF-4D16-995F-1B7EFD43A975}" dt="2020-09-10T15:18:20.751" v="0"/>
-          <ac:picMkLst>
-            <pc:docMk/>
-            <pc:sldMk cId="1022641883" sldId="289"/>
-            <ac:picMk id="13" creationId="{6B7689E5-DEA6-444A-84F3-B464EDE5819B}"/>
-          </ac:picMkLst>
-        </pc:picChg>
-      </pc:sldChg>
-      <pc:sldChg chg="delSp modAnim">
-        <pc:chgData name="Christel Maes" userId="7e61469a-7c21-464c-bace-a1bda262211a" providerId="ADAL" clId="{EB65D1DE-64AF-4D16-995F-1B7EFD43A975}" dt="2020-09-10T15:18:20.751" v="0"/>
-        <pc:sldMkLst>
-          <pc:docMk/>
-          <pc:sldMk cId="4294783759" sldId="290"/>
-        </pc:sldMkLst>
-        <pc:picChg chg="del">
-          <ac:chgData name="Christel Maes" userId="7e61469a-7c21-464c-bace-a1bda262211a" providerId="ADAL" clId="{EB65D1DE-64AF-4D16-995F-1B7EFD43A975}" dt="2020-09-10T15:18:20.751" v="0"/>
-          <ac:picMkLst>
-            <pc:docMk/>
-            <pc:sldMk cId="4294783759" sldId="290"/>
-            <ac:picMk id="4" creationId="{8B6BB2F0-DF92-4E24-810D-1DC61B07C77D}"/>
-          </ac:picMkLst>
-        </pc:picChg>
-      </pc:sldChg>
-      <pc:sldChg chg="delSp modAnim">
-        <pc:chgData name="Christel Maes" userId="7e61469a-7c21-464c-bace-a1bda262211a" providerId="ADAL" clId="{EB65D1DE-64AF-4D16-995F-1B7EFD43A975}" dt="2020-09-10T15:18:20.751" v="0"/>
-        <pc:sldMkLst>
-          <pc:docMk/>
-          <pc:sldMk cId="2357875275" sldId="294"/>
-        </pc:sldMkLst>
-        <pc:picChg chg="del">
-          <ac:chgData name="Christel Maes" userId="7e61469a-7c21-464c-bace-a1bda262211a" providerId="ADAL" clId="{EB65D1DE-64AF-4D16-995F-1B7EFD43A975}" dt="2020-09-10T15:18:20.751" v="0"/>
-          <ac:picMkLst>
-            <pc:docMk/>
-            <pc:sldMk cId="2357875275" sldId="294"/>
-            <ac:picMk id="7" creationId="{CA2B6B1F-C17D-4223-A77D-23EF65DD0F69}"/>
-          </ac:picMkLst>
-        </pc:picChg>
-      </pc:sldChg>
-      <pc:sldChg chg="delSp modAnim">
-        <pc:chgData name="Christel Maes" userId="7e61469a-7c21-464c-bace-a1bda262211a" providerId="ADAL" clId="{EB65D1DE-64AF-4D16-995F-1B7EFD43A975}" dt="2020-09-10T15:18:20.751" v="0"/>
-        <pc:sldMkLst>
-          <pc:docMk/>
-          <pc:sldMk cId="2904059153" sldId="295"/>
-        </pc:sldMkLst>
-        <pc:picChg chg="del">
-          <ac:chgData name="Christel Maes" userId="7e61469a-7c21-464c-bace-a1bda262211a" providerId="ADAL" clId="{EB65D1DE-64AF-4D16-995F-1B7EFD43A975}" dt="2020-09-10T15:18:20.751" v="0"/>
-          <ac:picMkLst>
-            <pc:docMk/>
-            <pc:sldMk cId="2904059153" sldId="295"/>
-            <ac:picMk id="5" creationId="{4BC0FC2C-D5CE-41CF-B3BC-975D8BCEC7FE}"/>
-          </ac:picMkLst>
-        </pc:picChg>
-      </pc:sldChg>
-      <pc:sldChg chg="delSp modAnim">
-        <pc:chgData name="Christel Maes" userId="7e61469a-7c21-464c-bace-a1bda262211a" providerId="ADAL" clId="{EB65D1DE-64AF-4D16-995F-1B7EFD43A975}" dt="2020-09-10T15:18:20.751" v="0"/>
-        <pc:sldMkLst>
-          <pc:docMk/>
-          <pc:sldMk cId="1956145419" sldId="296"/>
-        </pc:sldMkLst>
-        <pc:picChg chg="del">
-          <ac:chgData name="Christel Maes" userId="7e61469a-7c21-464c-bace-a1bda262211a" providerId="ADAL" clId="{EB65D1DE-64AF-4D16-995F-1B7EFD43A975}" dt="2020-09-10T15:18:20.751" v="0"/>
-          <ac:picMkLst>
-            <pc:docMk/>
-            <pc:sldMk cId="1956145419" sldId="296"/>
-            <ac:picMk id="4" creationId="{042F7D24-6047-451A-B197-B848E7ABD78C}"/>
-          </ac:picMkLst>
-        </pc:picChg>
-      </pc:sldChg>
-      <pc:sldChg chg="delSp modAnim">
-        <pc:chgData name="Christel Maes" userId="7e61469a-7c21-464c-bace-a1bda262211a" providerId="ADAL" clId="{EB65D1DE-64AF-4D16-995F-1B7EFD43A975}" dt="2020-09-10T15:18:20.751" v="0"/>
-        <pc:sldMkLst>
-          <pc:docMk/>
-          <pc:sldMk cId="1613200239" sldId="297"/>
-        </pc:sldMkLst>
-        <pc:picChg chg="del">
-          <ac:chgData name="Christel Maes" userId="7e61469a-7c21-464c-bace-a1bda262211a" providerId="ADAL" clId="{EB65D1DE-64AF-4D16-995F-1B7EFD43A975}" dt="2020-09-10T15:18:20.751" v="0"/>
-          <ac:picMkLst>
-            <pc:docMk/>
-            <pc:sldMk cId="1613200239" sldId="297"/>
-            <ac:picMk id="6" creationId="{578F5165-0E94-410F-8670-024099FBE299}"/>
-          </ac:picMkLst>
-        </pc:picChg>
-      </pc:sldChg>
-      <pc:sldChg chg="delSp modAnim">
-        <pc:chgData name="Christel Maes" userId="7e61469a-7c21-464c-bace-a1bda262211a" providerId="ADAL" clId="{EB65D1DE-64AF-4D16-995F-1B7EFD43A975}" dt="2020-09-10T15:18:20.751" v="0"/>
-        <pc:sldMkLst>
-          <pc:docMk/>
-          <pc:sldMk cId="3876857091" sldId="298"/>
-        </pc:sldMkLst>
-        <pc:picChg chg="del">
-          <ac:chgData name="Christel Maes" userId="7e61469a-7c21-464c-bace-a1bda262211a" providerId="ADAL" clId="{EB65D1DE-64AF-4D16-995F-1B7EFD43A975}" dt="2020-09-10T15:18:20.751" v="0"/>
-          <ac:picMkLst>
-            <pc:docMk/>
-            <pc:sldMk cId="3876857091" sldId="298"/>
-            <ac:picMk id="9" creationId="{161EBFA7-41BA-4A60-8B43-3309183B65CD}"/>
-          </ac:picMkLst>
-        </pc:picChg>
-      </pc:sldChg>
-      <pc:sldChg chg="delSp modAnim">
-        <pc:chgData name="Christel Maes" userId="7e61469a-7c21-464c-bace-a1bda262211a" providerId="ADAL" clId="{EB65D1DE-64AF-4D16-995F-1B7EFD43A975}" dt="2020-09-10T15:18:20.751" v="0"/>
-        <pc:sldMkLst>
-          <pc:docMk/>
-          <pc:sldMk cId="2167334292" sldId="299"/>
-        </pc:sldMkLst>
-        <pc:picChg chg="del">
-          <ac:chgData name="Christel Maes" userId="7e61469a-7c21-464c-bace-a1bda262211a" providerId="ADAL" clId="{EB65D1DE-64AF-4D16-995F-1B7EFD43A975}" dt="2020-09-10T15:18:20.751" v="0"/>
-          <ac:picMkLst>
-            <pc:docMk/>
-            <pc:sldMk cId="2167334292" sldId="299"/>
-            <ac:picMk id="6" creationId="{0F836460-A743-4E1A-83F5-826EC1F5F744}"/>
-          </ac:picMkLst>
-        </pc:picChg>
-      </pc:sldChg>
-      <pc:sldChg chg="delSp modAnim">
-        <pc:chgData name="Christel Maes" userId="7e61469a-7c21-464c-bace-a1bda262211a" providerId="ADAL" clId="{EB65D1DE-64AF-4D16-995F-1B7EFD43A975}" dt="2020-09-10T15:18:20.751" v="0"/>
-        <pc:sldMkLst>
-          <pc:docMk/>
-          <pc:sldMk cId="524085819" sldId="302"/>
-        </pc:sldMkLst>
-        <pc:picChg chg="del">
-          <ac:chgData name="Christel Maes" userId="7e61469a-7c21-464c-bace-a1bda262211a" providerId="ADAL" clId="{EB65D1DE-64AF-4D16-995F-1B7EFD43A975}" dt="2020-09-10T15:18:20.751" v="0"/>
-          <ac:picMkLst>
-            <pc:docMk/>
-            <pc:sldMk cId="524085819" sldId="302"/>
-            <ac:picMk id="3" creationId="{66DBF5A9-B2D8-4C8A-ADC5-A75CBF49A5B6}"/>
-          </ac:picMkLst>
-        </pc:picChg>
-      </pc:sldChg>
-      <pc:sldChg chg="delSp modAnim">
-        <pc:chgData name="Christel Maes" userId="7e61469a-7c21-464c-bace-a1bda262211a" providerId="ADAL" clId="{EB65D1DE-64AF-4D16-995F-1B7EFD43A975}" dt="2020-09-10T15:18:20.751" v="0"/>
-        <pc:sldMkLst>
-          <pc:docMk/>
-          <pc:sldMk cId="2011064558" sldId="303"/>
-        </pc:sldMkLst>
-        <pc:picChg chg="del">
-          <ac:chgData name="Christel Maes" userId="7e61469a-7c21-464c-bace-a1bda262211a" providerId="ADAL" clId="{EB65D1DE-64AF-4D16-995F-1B7EFD43A975}" dt="2020-09-10T15:18:20.751" v="0"/>
-          <ac:picMkLst>
-            <pc:docMk/>
-            <pc:sldMk cId="2011064558" sldId="303"/>
-            <ac:picMk id="6" creationId="{376C2BBB-5F49-49BA-B31C-86717C33E15C}"/>
-          </ac:picMkLst>
-        </pc:picChg>
-      </pc:sldChg>
-      <pc:sldChg chg="delSp modAnim">
-        <pc:chgData name="Christel Maes" userId="7e61469a-7c21-464c-bace-a1bda262211a" providerId="ADAL" clId="{EB65D1DE-64AF-4D16-995F-1B7EFD43A975}" dt="2020-09-10T15:18:20.751" v="0"/>
-        <pc:sldMkLst>
-          <pc:docMk/>
-          <pc:sldMk cId="3814101728" sldId="304"/>
-        </pc:sldMkLst>
-        <pc:picChg chg="del">
-          <ac:chgData name="Christel Maes" userId="7e61469a-7c21-464c-bace-a1bda262211a" providerId="ADAL" clId="{EB65D1DE-64AF-4D16-995F-1B7EFD43A975}" dt="2020-09-10T15:18:20.751" v="0"/>
-          <ac:picMkLst>
-            <pc:docMk/>
-            <pc:sldMk cId="3814101728" sldId="304"/>
-            <ac:picMk id="10" creationId="{EC6FB4AD-E37D-45BB-8DB6-445426C80C41}"/>
-          </ac:picMkLst>
-        </pc:picChg>
-      </pc:sldChg>
-      <pc:sldChg chg="delSp modAnim">
-        <pc:chgData name="Christel Maes" userId="7e61469a-7c21-464c-bace-a1bda262211a" providerId="ADAL" clId="{EB65D1DE-64AF-4D16-995F-1B7EFD43A975}" dt="2020-09-10T15:18:20.751" v="0"/>
-        <pc:sldMkLst>
-          <pc:docMk/>
-          <pc:sldMk cId="1088796419" sldId="305"/>
-        </pc:sldMkLst>
-        <pc:picChg chg="del">
-          <ac:chgData name="Christel Maes" userId="7e61469a-7c21-464c-bace-a1bda262211a" providerId="ADAL" clId="{EB65D1DE-64AF-4D16-995F-1B7EFD43A975}" dt="2020-09-10T15:18:20.751" v="0"/>
-          <ac:picMkLst>
-            <pc:docMk/>
-            <pc:sldMk cId="1088796419" sldId="305"/>
-            <ac:picMk id="6" creationId="{4BB5761A-3330-408A-A769-03A56FF8FBCB}"/>
-          </ac:picMkLst>
-        </pc:picChg>
-      </pc:sldChg>
-      <pc:sldChg chg="delSp modAnim">
-        <pc:chgData name="Christel Maes" userId="7e61469a-7c21-464c-bace-a1bda262211a" providerId="ADAL" clId="{EB65D1DE-64AF-4D16-995F-1B7EFD43A975}" dt="2020-09-10T15:18:20.751" v="0"/>
-        <pc:sldMkLst>
-          <pc:docMk/>
-          <pc:sldMk cId="2208920561" sldId="306"/>
-        </pc:sldMkLst>
-        <pc:picChg chg="del">
-          <ac:chgData name="Christel Maes" userId="7e61469a-7c21-464c-bace-a1bda262211a" providerId="ADAL" clId="{EB65D1DE-64AF-4D16-995F-1B7EFD43A975}" dt="2020-09-10T15:18:20.751" v="0"/>
-          <ac:picMkLst>
-            <pc:docMk/>
-            <pc:sldMk cId="2208920561" sldId="306"/>
-            <ac:picMk id="6" creationId="{C9CBF085-0EB7-4349-A33E-D1A0778ECE35}"/>
-          </ac:picMkLst>
-        </pc:picChg>
-      </pc:sldChg>
-      <pc:sldChg chg="delSp modAnim">
-        <pc:chgData name="Christel Maes" userId="7e61469a-7c21-464c-bace-a1bda262211a" providerId="ADAL" clId="{EB65D1DE-64AF-4D16-995F-1B7EFD43A975}" dt="2020-09-10T15:18:20.751" v="0"/>
-        <pc:sldMkLst>
-          <pc:docMk/>
-          <pc:sldMk cId="911337620" sldId="307"/>
-        </pc:sldMkLst>
-        <pc:picChg chg="del">
-          <ac:chgData name="Christel Maes" userId="7e61469a-7c21-464c-bace-a1bda262211a" providerId="ADAL" clId="{EB65D1DE-64AF-4D16-995F-1B7EFD43A975}" dt="2020-09-10T15:18:20.751" v="0"/>
-          <ac:picMkLst>
-            <pc:docMk/>
-            <pc:sldMk cId="911337620" sldId="307"/>
-            <ac:picMk id="7" creationId="{563B672A-B6AA-4F1E-9EAB-9EA61F54A5F2}"/>
-          </ac:picMkLst>
-        </pc:picChg>
-      </pc:sldChg>
-      <pc:sldChg chg="delSp modAnim">
-        <pc:chgData name="Christel Maes" userId="7e61469a-7c21-464c-bace-a1bda262211a" providerId="ADAL" clId="{EB65D1DE-64AF-4D16-995F-1B7EFD43A975}" dt="2020-09-10T15:18:20.751" v="0"/>
-        <pc:sldMkLst>
-          <pc:docMk/>
-          <pc:sldMk cId="46570853" sldId="308"/>
-        </pc:sldMkLst>
-        <pc:picChg chg="del">
-          <ac:chgData name="Christel Maes" userId="7e61469a-7c21-464c-bace-a1bda262211a" providerId="ADAL" clId="{EB65D1DE-64AF-4D16-995F-1B7EFD43A975}" dt="2020-09-10T15:18:20.751" v="0"/>
-          <ac:picMkLst>
-            <pc:docMk/>
-            <pc:sldMk cId="46570853" sldId="308"/>
-            <ac:picMk id="6" creationId="{B52DED2E-62F4-480E-A87E-BD20EFDB5B7E}"/>
-          </ac:picMkLst>
-        </pc:picChg>
-      </pc:sldChg>
-      <pc:sldChg chg="delSp modAnim">
-        <pc:chgData name="Christel Maes" userId="7e61469a-7c21-464c-bace-a1bda262211a" providerId="ADAL" clId="{EB65D1DE-64AF-4D16-995F-1B7EFD43A975}" dt="2020-09-10T15:18:20.751" v="0"/>
-        <pc:sldMkLst>
-          <pc:docMk/>
-          <pc:sldMk cId="2531460558" sldId="309"/>
-        </pc:sldMkLst>
-        <pc:picChg chg="del">
-          <ac:chgData name="Christel Maes" userId="7e61469a-7c21-464c-bace-a1bda262211a" providerId="ADAL" clId="{EB65D1DE-64AF-4D16-995F-1B7EFD43A975}" dt="2020-09-10T15:18:20.751" v="0"/>
-          <ac:picMkLst>
-            <pc:docMk/>
-            <pc:sldMk cId="2531460558" sldId="309"/>
-            <ac:picMk id="5" creationId="{7B3ECFD4-D92A-48D2-9D96-16599C777729}"/>
-          </ac:picMkLst>
-        </pc:picChg>
-      </pc:sldChg>
-      <pc:sldChg chg="delSp modAnim">
-        <pc:chgData name="Christel Maes" userId="7e61469a-7c21-464c-bace-a1bda262211a" providerId="ADAL" clId="{EB65D1DE-64AF-4D16-995F-1B7EFD43A975}" dt="2020-09-10T15:18:20.751" v="0"/>
-        <pc:sldMkLst>
-          <pc:docMk/>
-          <pc:sldMk cId="3374308686" sldId="310"/>
-        </pc:sldMkLst>
-        <pc:picChg chg="del">
-          <ac:chgData name="Christel Maes" userId="7e61469a-7c21-464c-bace-a1bda262211a" providerId="ADAL" clId="{EB65D1DE-64AF-4D16-995F-1B7EFD43A975}" dt="2020-09-10T15:18:20.751" v="0"/>
-          <ac:picMkLst>
-            <pc:docMk/>
-            <pc:sldMk cId="3374308686" sldId="310"/>
-            <ac:picMk id="6" creationId="{6B80F56A-1D17-4FC1-8325-EAF17FE72FC6}"/>
-          </ac:picMkLst>
-        </pc:picChg>
-      </pc:sldChg>
-      <pc:sldChg chg="delSp modAnim">
-        <pc:chgData name="Christel Maes" userId="7e61469a-7c21-464c-bace-a1bda262211a" providerId="ADAL" clId="{EB65D1DE-64AF-4D16-995F-1B7EFD43A975}" dt="2020-09-10T15:18:20.751" v="0"/>
-        <pc:sldMkLst>
-          <pc:docMk/>
-          <pc:sldMk cId="2488015683" sldId="311"/>
-        </pc:sldMkLst>
-        <pc:picChg chg="del">
-          <ac:chgData name="Christel Maes" userId="7e61469a-7c21-464c-bace-a1bda262211a" providerId="ADAL" clId="{EB65D1DE-64AF-4D16-995F-1B7EFD43A975}" dt="2020-09-10T15:18:20.751" v="0"/>
-          <ac:picMkLst>
-            <pc:docMk/>
-            <pc:sldMk cId="2488015683" sldId="311"/>
-            <ac:picMk id="7" creationId="{861296E5-5918-42F6-AF29-34A207BF5561}"/>
-          </ac:picMkLst>
-        </pc:picChg>
-      </pc:sldChg>
-      <pc:sldChg chg="delSp modAnim">
-        <pc:chgData name="Christel Maes" userId="7e61469a-7c21-464c-bace-a1bda262211a" providerId="ADAL" clId="{EB65D1DE-64AF-4D16-995F-1B7EFD43A975}" dt="2020-09-10T15:18:20.751" v="0"/>
-        <pc:sldMkLst>
-          <pc:docMk/>
-          <pc:sldMk cId="1517140393" sldId="312"/>
-        </pc:sldMkLst>
-        <pc:picChg chg="del">
-          <ac:chgData name="Christel Maes" userId="7e61469a-7c21-464c-bace-a1bda262211a" providerId="ADAL" clId="{EB65D1DE-64AF-4D16-995F-1B7EFD43A975}" dt="2020-09-10T15:18:20.751" v="0"/>
-          <ac:picMkLst>
-            <pc:docMk/>
-            <pc:sldMk cId="1517140393" sldId="312"/>
-            <ac:picMk id="8" creationId="{A092BC04-274B-4CE4-B0F4-022C40A1245F}"/>
-          </ac:picMkLst>
-        </pc:picChg>
-      </pc:sldChg>
-      <pc:sldChg chg="delSp modAnim">
-        <pc:chgData name="Christel Maes" userId="7e61469a-7c21-464c-bace-a1bda262211a" providerId="ADAL" clId="{EB65D1DE-64AF-4D16-995F-1B7EFD43A975}" dt="2020-09-10T15:18:20.751" v="0"/>
-        <pc:sldMkLst>
-          <pc:docMk/>
-          <pc:sldMk cId="4048209516" sldId="313"/>
-        </pc:sldMkLst>
-        <pc:picChg chg="del">
-          <ac:chgData name="Christel Maes" userId="7e61469a-7c21-464c-bace-a1bda262211a" providerId="ADAL" clId="{EB65D1DE-64AF-4D16-995F-1B7EFD43A975}" dt="2020-09-10T15:18:20.751" v="0"/>
-          <ac:picMkLst>
-            <pc:docMk/>
-            <pc:sldMk cId="4048209516" sldId="313"/>
-            <ac:picMk id="6" creationId="{D7710C24-73D8-40F6-8BDE-7B1F33D77A80}"/>
-          </ac:picMkLst>
-        </pc:picChg>
-      </pc:sldChg>
-      <pc:sldChg chg="delSp modAnim">
-        <pc:chgData name="Christel Maes" userId="7e61469a-7c21-464c-bace-a1bda262211a" providerId="ADAL" clId="{EB65D1DE-64AF-4D16-995F-1B7EFD43A975}" dt="2020-09-10T15:18:20.751" v="0"/>
-        <pc:sldMkLst>
-          <pc:docMk/>
-          <pc:sldMk cId="3024926684" sldId="314"/>
-        </pc:sldMkLst>
-        <pc:picChg chg="del">
-          <ac:chgData name="Christel Maes" userId="7e61469a-7c21-464c-bace-a1bda262211a" providerId="ADAL" clId="{EB65D1DE-64AF-4D16-995F-1B7EFD43A975}" dt="2020-09-10T15:18:20.751" v="0"/>
-          <ac:picMkLst>
-            <pc:docMk/>
-            <pc:sldMk cId="3024926684" sldId="314"/>
-            <ac:picMk id="6" creationId="{9BAFFC1D-00FC-49C9-8F7E-A47E2036D0A5}"/>
-          </ac:picMkLst>
-        </pc:picChg>
-      </pc:sldChg>
-      <pc:sldChg chg="delSp modAnim">
-        <pc:chgData name="Christel Maes" userId="7e61469a-7c21-464c-bace-a1bda262211a" providerId="ADAL" clId="{EB65D1DE-64AF-4D16-995F-1B7EFD43A975}" dt="2020-09-10T15:18:20.751" v="0"/>
-        <pc:sldMkLst>
-          <pc:docMk/>
-          <pc:sldMk cId="1078311508" sldId="315"/>
-        </pc:sldMkLst>
-        <pc:picChg chg="del">
-          <ac:chgData name="Christel Maes" userId="7e61469a-7c21-464c-bace-a1bda262211a" providerId="ADAL" clId="{EB65D1DE-64AF-4D16-995F-1B7EFD43A975}" dt="2020-09-10T15:18:20.751" v="0"/>
-          <ac:picMkLst>
-            <pc:docMk/>
-            <pc:sldMk cId="1078311508" sldId="315"/>
-            <ac:picMk id="6" creationId="{A20B327A-7146-4AFE-AE51-C590E0B0F427}"/>
-          </ac:picMkLst>
-        </pc:picChg>
-      </pc:sldChg>
-      <pc:sldChg chg="delSp modAnim">
-        <pc:chgData name="Christel Maes" userId="7e61469a-7c21-464c-bace-a1bda262211a" providerId="ADAL" clId="{EB65D1DE-64AF-4D16-995F-1B7EFD43A975}" dt="2020-09-10T15:18:20.751" v="0"/>
-        <pc:sldMkLst>
-          <pc:docMk/>
-          <pc:sldMk cId="1205063951" sldId="316"/>
-        </pc:sldMkLst>
-        <pc:picChg chg="del">
-          <ac:chgData name="Christel Maes" userId="7e61469a-7c21-464c-bace-a1bda262211a" providerId="ADAL" clId="{EB65D1DE-64AF-4D16-995F-1B7EFD43A975}" dt="2020-09-10T15:18:20.751" v="0"/>
-          <ac:picMkLst>
-            <pc:docMk/>
-            <pc:sldMk cId="1205063951" sldId="316"/>
-            <ac:picMk id="14" creationId="{0CCC36B1-450B-4D1D-AE41-0F103B228459}"/>
-          </ac:picMkLst>
-        </pc:picChg>
-      </pc:sldChg>
-    </pc:docChg>
-  </pc:docChgLst>
-  <pc:docChgLst>
-    <pc:chgData name="Christel Maes" userId="7e61469a-7c21-464c-bace-a1bda262211a" providerId="ADAL" clId="{D006C8EF-6211-41A2-9FC9-4DFCB4561B9B}"/>
-    <pc:docChg chg="custSel addSld modSld">
-      <pc:chgData name="Christel Maes" userId="7e61469a-7c21-464c-bace-a1bda262211a" providerId="ADAL" clId="{D006C8EF-6211-41A2-9FC9-4DFCB4561B9B}" dt="2020-03-26T13:20:00.718" v="194" actId="14100"/>
-      <pc:docMkLst>
-        <pc:docMk/>
-      </pc:docMkLst>
-      <pc:sldChg chg="addSp delSp modSp add">
-        <pc:chgData name="Christel Maes" userId="7e61469a-7c21-464c-bace-a1bda262211a" providerId="ADAL" clId="{D006C8EF-6211-41A2-9FC9-4DFCB4561B9B}" dt="2020-03-26T13:20:00.718" v="194" actId="14100"/>
-        <pc:sldMkLst>
-          <pc:docMk/>
-          <pc:sldMk cId="1205063951" sldId="316"/>
-        </pc:sldMkLst>
-        <pc:spChg chg="mod">
-          <ac:chgData name="Christel Maes" userId="7e61469a-7c21-464c-bace-a1bda262211a" providerId="ADAL" clId="{D006C8EF-6211-41A2-9FC9-4DFCB4561B9B}" dt="2020-03-26T13:04:57.403" v="77" actId="20577"/>
-          <ac:spMkLst>
-            <pc:docMk/>
-            <pc:sldMk cId="1205063951" sldId="316"/>
-            <ac:spMk id="2" creationId="{3AA6CEC6-2158-4E2D-AAAB-5F0AFB2A0592}"/>
-          </ac:spMkLst>
-        </pc:spChg>
-        <pc:spChg chg="mod">
-          <ac:chgData name="Christel Maes" userId="7e61469a-7c21-464c-bace-a1bda262211a" providerId="ADAL" clId="{D006C8EF-6211-41A2-9FC9-4DFCB4561B9B}" dt="2020-03-26T13:19:39.953" v="190" actId="20577"/>
-          <ac:spMkLst>
-            <pc:docMk/>
-            <pc:sldMk cId="1205063951" sldId="316"/>
-            <ac:spMk id="3" creationId="{866D395F-6B0D-46EB-9A83-008C409555E5}"/>
-          </ac:spMkLst>
-        </pc:spChg>
-        <pc:spChg chg="del">
-          <ac:chgData name="Christel Maes" userId="7e61469a-7c21-464c-bace-a1bda262211a" providerId="ADAL" clId="{D006C8EF-6211-41A2-9FC9-4DFCB4561B9B}" dt="2020-03-26T13:16:39.399" v="167" actId="478"/>
-          <ac:spMkLst>
-            <pc:docMk/>
-            <pc:sldMk cId="1205063951" sldId="316"/>
-            <ac:spMk id="7" creationId="{79E203A8-5189-4907-A17E-8E0F73D3513E}"/>
-          </ac:spMkLst>
-        </pc:spChg>
-        <pc:spChg chg="mod">
-          <ac:chgData name="Christel Maes" userId="7e61469a-7c21-464c-bace-a1bda262211a" providerId="ADAL" clId="{D006C8EF-6211-41A2-9FC9-4DFCB4561B9B}" dt="2020-03-26T13:20:00.718" v="194" actId="14100"/>
-          <ac:spMkLst>
-            <pc:docMk/>
-            <pc:sldMk cId="1205063951" sldId="316"/>
-            <ac:spMk id="8" creationId="{75551830-0E52-4E1E-9705-F6515D105745}"/>
-          </ac:spMkLst>
-        </pc:spChg>
-        <pc:spChg chg="add mod">
-          <ac:chgData name="Christel Maes" userId="7e61469a-7c21-464c-bace-a1bda262211a" providerId="ADAL" clId="{D006C8EF-6211-41A2-9FC9-4DFCB4561B9B}" dt="2020-03-26T13:18:36.772" v="179" actId="255"/>
-          <ac:spMkLst>
-            <pc:docMk/>
-            <pc:sldMk cId="1205063951" sldId="316"/>
-            <ac:spMk id="9" creationId="{557AD780-3082-4C32-A5C2-EC367696A85C}"/>
-          </ac:spMkLst>
-        </pc:spChg>
-        <pc:spChg chg="mod">
-          <ac:chgData name="Christel Maes" userId="7e61469a-7c21-464c-bace-a1bda262211a" providerId="ADAL" clId="{D006C8EF-6211-41A2-9FC9-4DFCB4561B9B}" dt="2020-03-26T13:19:49.692" v="191" actId="14100"/>
-          <ac:spMkLst>
-            <pc:docMk/>
-            <pc:sldMk cId="1205063951" sldId="316"/>
-            <ac:spMk id="10" creationId="{E9B81CEE-9939-4830-B526-669A21C076A7}"/>
-          </ac:spMkLst>
-        </pc:spChg>
-        <pc:spChg chg="mod">
-          <ac:chgData name="Christel Maes" userId="7e61469a-7c21-464c-bace-a1bda262211a" providerId="ADAL" clId="{D006C8EF-6211-41A2-9FC9-4DFCB4561B9B}" dt="2020-03-26T13:18:52.845" v="182" actId="14100"/>
-          <ac:spMkLst>
-            <pc:docMk/>
-            <pc:sldMk cId="1205063951" sldId="316"/>
-            <ac:spMk id="11" creationId="{D28ADD64-602C-4830-9C08-797D042F2532}"/>
-          </ac:spMkLst>
-        </pc:spChg>
-        <pc:spChg chg="mod">
-          <ac:chgData name="Christel Maes" userId="7e61469a-7c21-464c-bace-a1bda262211a" providerId="ADAL" clId="{D006C8EF-6211-41A2-9FC9-4DFCB4561B9B}" dt="2020-03-26T13:19:23.174" v="185" actId="14100"/>
-          <ac:spMkLst>
-            <pc:docMk/>
-            <pc:sldMk cId="1205063951" sldId="316"/>
-            <ac:spMk id="12" creationId="{B3335AFC-9B00-4C5F-A059-7BBEB767E7E1}"/>
-          </ac:spMkLst>
-        </pc:spChg>
-        <pc:spChg chg="mod">
-          <ac:chgData name="Christel Maes" userId="7e61469a-7c21-464c-bace-a1bda262211a" providerId="ADAL" clId="{D006C8EF-6211-41A2-9FC9-4DFCB4561B9B}" dt="2020-03-26T13:19:27.121" v="189" actId="14100"/>
-          <ac:spMkLst>
-            <pc:docMk/>
-            <pc:sldMk cId="1205063951" sldId="316"/>
-            <ac:spMk id="13" creationId="{9BBFDF69-1E9E-4497-B72C-3383A9CFDF53}"/>
-          </ac:spMkLst>
-        </pc:spChg>
-        <pc:picChg chg="del">
-          <ac:chgData name="Christel Maes" userId="7e61469a-7c21-464c-bace-a1bda262211a" providerId="ADAL" clId="{D006C8EF-6211-41A2-9FC9-4DFCB4561B9B}" dt="2020-03-26T13:16:06.942" v="151" actId="478"/>
-          <ac:picMkLst>
-            <pc:docMk/>
-            <pc:sldMk cId="1205063951" sldId="316"/>
-            <ac:picMk id="5" creationId="{45F7716C-F5B6-4512-A926-95B861ED7EBD}"/>
-          </ac:picMkLst>
-        </pc:picChg>
-        <pc:picChg chg="add mod ord">
-          <ac:chgData name="Christel Maes" userId="7e61469a-7c21-464c-bace-a1bda262211a" providerId="ADAL" clId="{D006C8EF-6211-41A2-9FC9-4DFCB4561B9B}" dt="2020-03-26T13:16:28.063" v="166" actId="1038"/>
-          <ac:picMkLst>
-            <pc:docMk/>
-            <pc:sldMk cId="1205063951" sldId="316"/>
-            <ac:picMk id="6" creationId="{13A58B88-4F2D-4C49-B662-2E401EAAF241}"/>
-          </ac:picMkLst>
-        </pc:picChg>
-      </pc:sldChg>
-    </pc:docChg>
-  </pc:docChgLst>
-  <pc:docChgLst>
-    <pc:chgData name="Christel Maes" userId="7e61469a-7c21-464c-bace-a1bda262211a" providerId="ADAL" clId="{B5CD5A5B-23BA-40C5-AEF0-16AE51DB6A5A}"/>
-    <pc:docChg chg="undo custSel modSld modShowInfo">
-      <pc:chgData name="Christel Maes" userId="7e61469a-7c21-464c-bace-a1bda262211a" providerId="ADAL" clId="{B5CD5A5B-23BA-40C5-AEF0-16AE51DB6A5A}" dt="2020-09-21T07:08:55.042" v="15" actId="2744"/>
-      <pc:docMkLst>
-        <pc:docMk/>
-      </pc:docMkLst>
-      <pc:sldChg chg="modSp mod">
-        <pc:chgData name="Christel Maes" userId="7e61469a-7c21-464c-bace-a1bda262211a" providerId="ADAL" clId="{B5CD5A5B-23BA-40C5-AEF0-16AE51DB6A5A}" dt="2020-09-20T09:40:04.058" v="11" actId="20577"/>
-        <pc:sldMkLst>
-          <pc:docMk/>
-          <pc:sldMk cId="59728421" sldId="285"/>
-        </pc:sldMkLst>
-        <pc:graphicFrameChg chg="modGraphic">
-          <ac:chgData name="Christel Maes" userId="7e61469a-7c21-464c-bace-a1bda262211a" providerId="ADAL" clId="{B5CD5A5B-23BA-40C5-AEF0-16AE51DB6A5A}" dt="2020-09-20T09:40:04.058" v="11" actId="20577"/>
-          <ac:graphicFrameMkLst>
-            <pc:docMk/>
-            <pc:sldMk cId="59728421" sldId="285"/>
-            <ac:graphicFrameMk id="4" creationId="{D26B8449-CAA6-4957-BFBF-58850FD4FB01}"/>
-          </ac:graphicFrameMkLst>
-        </pc:graphicFrameChg>
-      </pc:sldChg>
-      <pc:sldChg chg="delSp modSp mod">
-        <pc:chgData name="Christel Maes" userId="7e61469a-7c21-464c-bace-a1bda262211a" providerId="ADAL" clId="{B5CD5A5B-23BA-40C5-AEF0-16AE51DB6A5A}" dt="2020-09-20T09:39:54.092" v="10" actId="478"/>
-        <pc:sldMkLst>
-          <pc:docMk/>
-          <pc:sldMk cId="43088005" sldId="288"/>
-        </pc:sldMkLst>
-        <pc:spChg chg="del">
-          <ac:chgData name="Christel Maes" userId="7e61469a-7c21-464c-bace-a1bda262211a" providerId="ADAL" clId="{B5CD5A5B-23BA-40C5-AEF0-16AE51DB6A5A}" dt="2020-09-20T09:39:54.092" v="10" actId="478"/>
-          <ac:spMkLst>
-            <pc:docMk/>
-            <pc:sldMk cId="43088005" sldId="288"/>
-            <ac:spMk id="5" creationId="{FE28E44A-73DE-43BA-9A30-BE8CEDD91E39}"/>
-          </ac:spMkLst>
-        </pc:spChg>
-        <pc:spChg chg="mod">
-          <ac:chgData name="Christel Maes" userId="7e61469a-7c21-464c-bace-a1bda262211a" providerId="ADAL" clId="{B5CD5A5B-23BA-40C5-AEF0-16AE51DB6A5A}" dt="2020-09-20T09:37:25.963" v="9" actId="20577"/>
-          <ac:spMkLst>
-            <pc:docMk/>
-            <pc:sldMk cId="43088005" sldId="288"/>
-            <ac:spMk id="494594" creationId="{00000000-0000-0000-0000-000000000000}"/>
-          </ac:spMkLst>
-        </pc:spChg>
-      </pc:sldChg>
-      <pc:sldChg chg="modSp mod">
-        <pc:chgData name="Christel Maes" userId="7e61469a-7c21-464c-bace-a1bda262211a" providerId="ADAL" clId="{B5CD5A5B-23BA-40C5-AEF0-16AE51DB6A5A}" dt="2020-09-20T09:42:09.769" v="14" actId="313"/>
-        <pc:sldMkLst>
-          <pc:docMk/>
-          <pc:sldMk cId="2167334292" sldId="299"/>
-        </pc:sldMkLst>
-        <pc:spChg chg="mod">
-          <ac:chgData name="Christel Maes" userId="7e61469a-7c21-464c-bace-a1bda262211a" providerId="ADAL" clId="{B5CD5A5B-23BA-40C5-AEF0-16AE51DB6A5A}" dt="2020-09-20T09:42:09.769" v="14" actId="313"/>
-          <ac:spMkLst>
-            <pc:docMk/>
-            <pc:sldMk cId="2167334292" sldId="299"/>
-            <ac:spMk id="5" creationId="{00000000-0000-0000-0000-000000000000}"/>
-          </ac:spMkLst>
-        </pc:spChg>
-      </pc:sldChg>
-      <pc:sldChg chg="modSp mod">
-        <pc:chgData name="Christel Maes" userId="7e61469a-7c21-464c-bace-a1bda262211a" providerId="ADAL" clId="{B5CD5A5B-23BA-40C5-AEF0-16AE51DB6A5A}" dt="2020-09-18T13:00:48.912" v="1" actId="207"/>
-        <pc:sldMkLst>
-          <pc:docMk/>
-          <pc:sldMk cId="2208920561" sldId="306"/>
-        </pc:sldMkLst>
-        <pc:spChg chg="mod">
-          <ac:chgData name="Christel Maes" userId="7e61469a-7c21-464c-bace-a1bda262211a" providerId="ADAL" clId="{B5CD5A5B-23BA-40C5-AEF0-16AE51DB6A5A}" dt="2020-09-18T13:00:48.912" v="1" actId="207"/>
-          <ac:spMkLst>
-            <pc:docMk/>
-            <pc:sldMk cId="2208920561" sldId="306"/>
-            <ac:spMk id="3" creationId="{00000000-0000-0000-0000-000000000000}"/>
-          </ac:spMkLst>
-        </pc:spChg>
-      </pc:sldChg>
-    </pc:docChg>
-  </pc:docChgLst>
-  <pc:docChgLst>
     <pc:chgData name="Jochen Mariën" userId="a4f8d9ed-3895-4365-b2d5-9432cb8a20d4" providerId="ADAL" clId="{3E5D4F97-4AF9-45BF-8D7E-DF2C95C8B6E7}"/>
     <pc:docChg chg="undo custSel delSld modSld modMainMaster">
       <pc:chgData name="Jochen Mariën" userId="a4f8d9ed-3895-4365-b2d5-9432cb8a20d4" providerId="ADAL" clId="{3E5D4F97-4AF9-45BF-8D7E-DF2C95C8B6E7}" dt="2022-06-02T14:53:43.391" v="70" actId="20577"/>
@@ -4285,6 +3420,714 @@
     </pc:docChg>
   </pc:docChgLst>
   <pc:docChgLst>
+    <pc:chgData name="Hans Bartholomeus" userId="fdad893c-ea0f-4e18-a760-ac9a83339ccd" providerId="ADAL" clId="{E1B84243-F818-443F-B3F9-94F107148CB2}"/>
+    <pc:docChg chg="custSel modSld">
+      <pc:chgData name="Hans Bartholomeus" userId="fdad893c-ea0f-4e18-a760-ac9a83339ccd" providerId="ADAL" clId="{E1B84243-F818-443F-B3F9-94F107148CB2}" dt="2020-09-18T10:32:00.933" v="57" actId="478"/>
+      <pc:docMkLst>
+        <pc:docMk/>
+      </pc:docMkLst>
+      <pc:sldChg chg="delSp mod">
+        <pc:chgData name="Hans Bartholomeus" userId="fdad893c-ea0f-4e18-a760-ac9a83339ccd" providerId="ADAL" clId="{E1B84243-F818-443F-B3F9-94F107148CB2}" dt="2020-09-18T10:32:00.933" v="57" actId="478"/>
+        <pc:sldMkLst>
+          <pc:docMk/>
+          <pc:sldMk cId="43088005" sldId="288"/>
+        </pc:sldMkLst>
+        <pc:spChg chg="del">
+          <ac:chgData name="Hans Bartholomeus" userId="fdad893c-ea0f-4e18-a760-ac9a83339ccd" providerId="ADAL" clId="{E1B84243-F818-443F-B3F9-94F107148CB2}" dt="2020-09-18T10:32:00.933" v="57" actId="478"/>
+          <ac:spMkLst>
+            <pc:docMk/>
+            <pc:sldMk cId="43088005" sldId="288"/>
+            <ac:spMk id="13" creationId="{00000000-0000-0000-0000-000000000000}"/>
+          </ac:spMkLst>
+        </pc:spChg>
+      </pc:sldChg>
+      <pc:sldChg chg="modSp mod">
+        <pc:chgData name="Hans Bartholomeus" userId="fdad893c-ea0f-4e18-a760-ac9a83339ccd" providerId="ADAL" clId="{E1B84243-F818-443F-B3F9-94F107148CB2}" dt="2020-09-18T09:40:46.915" v="56" actId="20577"/>
+        <pc:sldMkLst>
+          <pc:docMk/>
+          <pc:sldMk cId="2208920561" sldId="306"/>
+        </pc:sldMkLst>
+        <pc:spChg chg="mod">
+          <ac:chgData name="Hans Bartholomeus" userId="fdad893c-ea0f-4e18-a760-ac9a83339ccd" providerId="ADAL" clId="{E1B84243-F818-443F-B3F9-94F107148CB2}" dt="2020-09-18T09:40:46.915" v="56" actId="20577"/>
+          <ac:spMkLst>
+            <pc:docMk/>
+            <pc:sldMk cId="2208920561" sldId="306"/>
+            <ac:spMk id="3" creationId="{00000000-0000-0000-0000-000000000000}"/>
+          </ac:spMkLst>
+        </pc:spChg>
+      </pc:sldChg>
+    </pc:docChg>
+  </pc:docChgLst>
+  <pc:docChgLst>
+    <pc:chgData name="Christel Maes" userId="7e61469a-7c21-464c-bace-a1bda262211a" providerId="ADAL" clId="{EB65D1DE-64AF-4D16-995F-1B7EFD43A975}"/>
+    <pc:docChg chg="modSld">
+      <pc:chgData name="Christel Maes" userId="7e61469a-7c21-464c-bace-a1bda262211a" providerId="ADAL" clId="{EB65D1DE-64AF-4D16-995F-1B7EFD43A975}" dt="2020-09-10T15:18:20.751" v="0"/>
+      <pc:docMkLst>
+        <pc:docMk/>
+      </pc:docMkLst>
+      <pc:sldChg chg="delSp modAnim">
+        <pc:chgData name="Christel Maes" userId="7e61469a-7c21-464c-bace-a1bda262211a" providerId="ADAL" clId="{EB65D1DE-64AF-4D16-995F-1B7EFD43A975}" dt="2020-09-10T15:18:20.751" v="0"/>
+        <pc:sldMkLst>
+          <pc:docMk/>
+          <pc:sldMk cId="112707644" sldId="266"/>
+        </pc:sldMkLst>
+        <pc:picChg chg="del">
+          <ac:chgData name="Christel Maes" userId="7e61469a-7c21-464c-bace-a1bda262211a" providerId="ADAL" clId="{EB65D1DE-64AF-4D16-995F-1B7EFD43A975}" dt="2020-09-10T15:18:20.751" v="0"/>
+          <ac:picMkLst>
+            <pc:docMk/>
+            <pc:sldMk cId="112707644" sldId="266"/>
+            <ac:picMk id="8" creationId="{28E567BE-D71B-4437-9EA6-A8A3E49B534E}"/>
+          </ac:picMkLst>
+        </pc:picChg>
+      </pc:sldChg>
+      <pc:sldChg chg="delSp modAnim">
+        <pc:chgData name="Christel Maes" userId="7e61469a-7c21-464c-bace-a1bda262211a" providerId="ADAL" clId="{EB65D1DE-64AF-4D16-995F-1B7EFD43A975}" dt="2020-09-10T15:18:20.751" v="0"/>
+        <pc:sldMkLst>
+          <pc:docMk/>
+          <pc:sldMk cId="2667205004" sldId="269"/>
+        </pc:sldMkLst>
+        <pc:picChg chg="del">
+          <ac:chgData name="Christel Maes" userId="7e61469a-7c21-464c-bace-a1bda262211a" providerId="ADAL" clId="{EB65D1DE-64AF-4D16-995F-1B7EFD43A975}" dt="2020-09-10T15:18:20.751" v="0"/>
+          <ac:picMkLst>
+            <pc:docMk/>
+            <pc:sldMk cId="2667205004" sldId="269"/>
+            <ac:picMk id="4" creationId="{EBBCA4D5-DBC8-4F13-AAE5-1F8250E55044}"/>
+          </ac:picMkLst>
+        </pc:picChg>
+      </pc:sldChg>
+      <pc:sldChg chg="delSp modAnim">
+        <pc:chgData name="Christel Maes" userId="7e61469a-7c21-464c-bace-a1bda262211a" providerId="ADAL" clId="{EB65D1DE-64AF-4D16-995F-1B7EFD43A975}" dt="2020-09-10T15:18:20.751" v="0"/>
+        <pc:sldMkLst>
+          <pc:docMk/>
+          <pc:sldMk cId="2718411288" sldId="270"/>
+        </pc:sldMkLst>
+        <pc:picChg chg="del">
+          <ac:chgData name="Christel Maes" userId="7e61469a-7c21-464c-bace-a1bda262211a" providerId="ADAL" clId="{EB65D1DE-64AF-4D16-995F-1B7EFD43A975}" dt="2020-09-10T15:18:20.751" v="0"/>
+          <ac:picMkLst>
+            <pc:docMk/>
+            <pc:sldMk cId="2718411288" sldId="270"/>
+            <ac:picMk id="5" creationId="{C110C81C-F461-4773-9E2D-3E67C3A0A056}"/>
+          </ac:picMkLst>
+        </pc:picChg>
+      </pc:sldChg>
+      <pc:sldChg chg="delSp modAnim">
+        <pc:chgData name="Christel Maes" userId="7e61469a-7c21-464c-bace-a1bda262211a" providerId="ADAL" clId="{EB65D1DE-64AF-4D16-995F-1B7EFD43A975}" dt="2020-09-10T15:18:20.751" v="0"/>
+        <pc:sldMkLst>
+          <pc:docMk/>
+          <pc:sldMk cId="523898943" sldId="271"/>
+        </pc:sldMkLst>
+        <pc:picChg chg="del">
+          <ac:chgData name="Christel Maes" userId="7e61469a-7c21-464c-bace-a1bda262211a" providerId="ADAL" clId="{EB65D1DE-64AF-4D16-995F-1B7EFD43A975}" dt="2020-09-10T15:18:20.751" v="0"/>
+          <ac:picMkLst>
+            <pc:docMk/>
+            <pc:sldMk cId="523898943" sldId="271"/>
+            <ac:picMk id="2" creationId="{FB4EBBEF-CF96-41D0-8246-94F6941B7768}"/>
+          </ac:picMkLst>
+        </pc:picChg>
+      </pc:sldChg>
+      <pc:sldChg chg="delSp modAnim">
+        <pc:chgData name="Christel Maes" userId="7e61469a-7c21-464c-bace-a1bda262211a" providerId="ADAL" clId="{EB65D1DE-64AF-4D16-995F-1B7EFD43A975}" dt="2020-09-10T15:18:20.751" v="0"/>
+        <pc:sldMkLst>
+          <pc:docMk/>
+          <pc:sldMk cId="448105480" sldId="272"/>
+        </pc:sldMkLst>
+        <pc:picChg chg="del">
+          <ac:chgData name="Christel Maes" userId="7e61469a-7c21-464c-bace-a1bda262211a" providerId="ADAL" clId="{EB65D1DE-64AF-4D16-995F-1B7EFD43A975}" dt="2020-09-10T15:18:20.751" v="0"/>
+          <ac:picMkLst>
+            <pc:docMk/>
+            <pc:sldMk cId="448105480" sldId="272"/>
+            <ac:picMk id="7" creationId="{768A3B87-A4EE-4DCD-9F03-A1A2F2A0E3A0}"/>
+          </ac:picMkLst>
+        </pc:picChg>
+      </pc:sldChg>
+      <pc:sldChg chg="delSp modAnim">
+        <pc:chgData name="Christel Maes" userId="7e61469a-7c21-464c-bace-a1bda262211a" providerId="ADAL" clId="{EB65D1DE-64AF-4D16-995F-1B7EFD43A975}" dt="2020-09-10T15:18:20.751" v="0"/>
+        <pc:sldMkLst>
+          <pc:docMk/>
+          <pc:sldMk cId="2442765326" sldId="273"/>
+        </pc:sldMkLst>
+        <pc:picChg chg="del">
+          <ac:chgData name="Christel Maes" userId="7e61469a-7c21-464c-bace-a1bda262211a" providerId="ADAL" clId="{EB65D1DE-64AF-4D16-995F-1B7EFD43A975}" dt="2020-09-10T15:18:20.751" v="0"/>
+          <ac:picMkLst>
+            <pc:docMk/>
+            <pc:sldMk cId="2442765326" sldId="273"/>
+            <ac:picMk id="6" creationId="{57638C34-8A6A-4254-A7A9-56BE957AF80A}"/>
+          </ac:picMkLst>
+        </pc:picChg>
+      </pc:sldChg>
+      <pc:sldChg chg="delSp modAnim">
+        <pc:chgData name="Christel Maes" userId="7e61469a-7c21-464c-bace-a1bda262211a" providerId="ADAL" clId="{EB65D1DE-64AF-4D16-995F-1B7EFD43A975}" dt="2020-09-10T15:18:20.751" v="0"/>
+        <pc:sldMkLst>
+          <pc:docMk/>
+          <pc:sldMk cId="1505779418" sldId="274"/>
+        </pc:sldMkLst>
+        <pc:picChg chg="del">
+          <ac:chgData name="Christel Maes" userId="7e61469a-7c21-464c-bace-a1bda262211a" providerId="ADAL" clId="{EB65D1DE-64AF-4D16-995F-1B7EFD43A975}" dt="2020-09-10T15:18:20.751" v="0"/>
+          <ac:picMkLst>
+            <pc:docMk/>
+            <pc:sldMk cId="1505779418" sldId="274"/>
+            <ac:picMk id="4" creationId="{97E51C7C-797A-42D4-BEB1-3F78376AFFD1}"/>
+          </ac:picMkLst>
+        </pc:picChg>
+      </pc:sldChg>
+      <pc:sldChg chg="delSp modAnim">
+        <pc:chgData name="Christel Maes" userId="7e61469a-7c21-464c-bace-a1bda262211a" providerId="ADAL" clId="{EB65D1DE-64AF-4D16-995F-1B7EFD43A975}" dt="2020-09-10T15:18:20.751" v="0"/>
+        <pc:sldMkLst>
+          <pc:docMk/>
+          <pc:sldMk cId="399813621" sldId="275"/>
+        </pc:sldMkLst>
+        <pc:picChg chg="del">
+          <ac:chgData name="Christel Maes" userId="7e61469a-7c21-464c-bace-a1bda262211a" providerId="ADAL" clId="{EB65D1DE-64AF-4D16-995F-1B7EFD43A975}" dt="2020-09-10T15:18:20.751" v="0"/>
+          <ac:picMkLst>
+            <pc:docMk/>
+            <pc:sldMk cId="399813621" sldId="275"/>
+            <ac:picMk id="7" creationId="{756585F3-E659-457C-86B8-3029F0898B38}"/>
+          </ac:picMkLst>
+        </pc:picChg>
+      </pc:sldChg>
+      <pc:sldChg chg="delSp modAnim">
+        <pc:chgData name="Christel Maes" userId="7e61469a-7c21-464c-bace-a1bda262211a" providerId="ADAL" clId="{EB65D1DE-64AF-4D16-995F-1B7EFD43A975}" dt="2020-09-10T15:18:20.751" v="0"/>
+        <pc:sldMkLst>
+          <pc:docMk/>
+          <pc:sldMk cId="2708364635" sldId="276"/>
+        </pc:sldMkLst>
+        <pc:picChg chg="del">
+          <ac:chgData name="Christel Maes" userId="7e61469a-7c21-464c-bace-a1bda262211a" providerId="ADAL" clId="{EB65D1DE-64AF-4D16-995F-1B7EFD43A975}" dt="2020-09-10T15:18:20.751" v="0"/>
+          <ac:picMkLst>
+            <pc:docMk/>
+            <pc:sldMk cId="2708364635" sldId="276"/>
+            <ac:picMk id="6" creationId="{4CF3C8E1-A671-4C5F-924C-FD13B6D1F646}"/>
+          </ac:picMkLst>
+        </pc:picChg>
+      </pc:sldChg>
+      <pc:sldChg chg="delSp modAnim">
+        <pc:chgData name="Christel Maes" userId="7e61469a-7c21-464c-bace-a1bda262211a" providerId="ADAL" clId="{EB65D1DE-64AF-4D16-995F-1B7EFD43A975}" dt="2020-09-10T15:18:20.751" v="0"/>
+        <pc:sldMkLst>
+          <pc:docMk/>
+          <pc:sldMk cId="937416680" sldId="277"/>
+        </pc:sldMkLst>
+        <pc:picChg chg="del">
+          <ac:chgData name="Christel Maes" userId="7e61469a-7c21-464c-bace-a1bda262211a" providerId="ADAL" clId="{EB65D1DE-64AF-4D16-995F-1B7EFD43A975}" dt="2020-09-10T15:18:20.751" v="0"/>
+          <ac:picMkLst>
+            <pc:docMk/>
+            <pc:sldMk cId="937416680" sldId="277"/>
+            <ac:picMk id="4" creationId="{03F366B2-79B4-43B5-85FB-5FEDF29DE966}"/>
+          </ac:picMkLst>
+        </pc:picChg>
+      </pc:sldChg>
+      <pc:sldChg chg="delSp modAnim">
+        <pc:chgData name="Christel Maes" userId="7e61469a-7c21-464c-bace-a1bda262211a" providerId="ADAL" clId="{EB65D1DE-64AF-4D16-995F-1B7EFD43A975}" dt="2020-09-10T15:18:20.751" v="0"/>
+        <pc:sldMkLst>
+          <pc:docMk/>
+          <pc:sldMk cId="2442208220" sldId="278"/>
+        </pc:sldMkLst>
+        <pc:picChg chg="del">
+          <ac:chgData name="Christel Maes" userId="7e61469a-7c21-464c-bace-a1bda262211a" providerId="ADAL" clId="{EB65D1DE-64AF-4D16-995F-1B7EFD43A975}" dt="2020-09-10T15:18:20.751" v="0"/>
+          <ac:picMkLst>
+            <pc:docMk/>
+            <pc:sldMk cId="2442208220" sldId="278"/>
+            <ac:picMk id="12" creationId="{76FC78D4-D9C4-4BD5-9100-1A00826A40D3}"/>
+          </ac:picMkLst>
+        </pc:picChg>
+      </pc:sldChg>
+      <pc:sldChg chg="delSp modAnim">
+        <pc:chgData name="Christel Maes" userId="7e61469a-7c21-464c-bace-a1bda262211a" providerId="ADAL" clId="{EB65D1DE-64AF-4D16-995F-1B7EFD43A975}" dt="2020-09-10T15:18:20.751" v="0"/>
+        <pc:sldMkLst>
+          <pc:docMk/>
+          <pc:sldMk cId="3473159973" sldId="279"/>
+        </pc:sldMkLst>
+        <pc:picChg chg="del">
+          <ac:chgData name="Christel Maes" userId="7e61469a-7c21-464c-bace-a1bda262211a" providerId="ADAL" clId="{EB65D1DE-64AF-4D16-995F-1B7EFD43A975}" dt="2020-09-10T15:18:20.751" v="0"/>
+          <ac:picMkLst>
+            <pc:docMk/>
+            <pc:sldMk cId="3473159973" sldId="279"/>
+            <ac:picMk id="6" creationId="{A3036D6F-D405-4C89-B943-1350615B0DE5}"/>
+          </ac:picMkLst>
+        </pc:picChg>
+      </pc:sldChg>
+      <pc:sldChg chg="delSp modAnim">
+        <pc:chgData name="Christel Maes" userId="7e61469a-7c21-464c-bace-a1bda262211a" providerId="ADAL" clId="{EB65D1DE-64AF-4D16-995F-1B7EFD43A975}" dt="2020-09-10T15:18:20.751" v="0"/>
+        <pc:sldMkLst>
+          <pc:docMk/>
+          <pc:sldMk cId="3707028608" sldId="280"/>
+        </pc:sldMkLst>
+        <pc:picChg chg="del">
+          <ac:chgData name="Christel Maes" userId="7e61469a-7c21-464c-bace-a1bda262211a" providerId="ADAL" clId="{EB65D1DE-64AF-4D16-995F-1B7EFD43A975}" dt="2020-09-10T15:18:20.751" v="0"/>
+          <ac:picMkLst>
+            <pc:docMk/>
+            <pc:sldMk cId="3707028608" sldId="280"/>
+            <ac:picMk id="9" creationId="{6986EE8F-0CE8-45FD-8FCE-06760C4C47A2}"/>
+          </ac:picMkLst>
+        </pc:picChg>
+      </pc:sldChg>
+      <pc:sldChg chg="delSp modAnim">
+        <pc:chgData name="Christel Maes" userId="7e61469a-7c21-464c-bace-a1bda262211a" providerId="ADAL" clId="{EB65D1DE-64AF-4D16-995F-1B7EFD43A975}" dt="2020-09-10T15:18:20.751" v="0"/>
+        <pc:sldMkLst>
+          <pc:docMk/>
+          <pc:sldMk cId="2497475297" sldId="281"/>
+        </pc:sldMkLst>
+        <pc:picChg chg="del">
+          <ac:chgData name="Christel Maes" userId="7e61469a-7c21-464c-bace-a1bda262211a" providerId="ADAL" clId="{EB65D1DE-64AF-4D16-995F-1B7EFD43A975}" dt="2020-09-10T15:18:20.751" v="0"/>
+          <ac:picMkLst>
+            <pc:docMk/>
+            <pc:sldMk cId="2497475297" sldId="281"/>
+            <ac:picMk id="14" creationId="{2291C51A-B2B3-42BF-88D3-AA49FB9B7D1B}"/>
+          </ac:picMkLst>
+        </pc:picChg>
+      </pc:sldChg>
+      <pc:sldChg chg="delSp modAnim">
+        <pc:chgData name="Christel Maes" userId="7e61469a-7c21-464c-bace-a1bda262211a" providerId="ADAL" clId="{EB65D1DE-64AF-4D16-995F-1B7EFD43A975}" dt="2020-09-10T15:18:20.751" v="0"/>
+        <pc:sldMkLst>
+          <pc:docMk/>
+          <pc:sldMk cId="580256068" sldId="282"/>
+        </pc:sldMkLst>
+        <pc:picChg chg="del">
+          <ac:chgData name="Christel Maes" userId="7e61469a-7c21-464c-bace-a1bda262211a" providerId="ADAL" clId="{EB65D1DE-64AF-4D16-995F-1B7EFD43A975}" dt="2020-09-10T15:18:20.751" v="0"/>
+          <ac:picMkLst>
+            <pc:docMk/>
+            <pc:sldMk cId="580256068" sldId="282"/>
+            <ac:picMk id="4" creationId="{33ABBEF8-7366-4074-B8D1-6BCCB892F57E}"/>
+          </ac:picMkLst>
+        </pc:picChg>
+      </pc:sldChg>
+      <pc:sldChg chg="delSp modAnim">
+        <pc:chgData name="Christel Maes" userId="7e61469a-7c21-464c-bace-a1bda262211a" providerId="ADAL" clId="{EB65D1DE-64AF-4D16-995F-1B7EFD43A975}" dt="2020-09-10T15:18:20.751" v="0"/>
+        <pc:sldMkLst>
+          <pc:docMk/>
+          <pc:sldMk cId="4167317431" sldId="283"/>
+        </pc:sldMkLst>
+        <pc:picChg chg="del">
+          <ac:chgData name="Christel Maes" userId="7e61469a-7c21-464c-bace-a1bda262211a" providerId="ADAL" clId="{EB65D1DE-64AF-4D16-995F-1B7EFD43A975}" dt="2020-09-10T15:18:20.751" v="0"/>
+          <ac:picMkLst>
+            <pc:docMk/>
+            <pc:sldMk cId="4167317431" sldId="283"/>
+            <ac:picMk id="5" creationId="{20802149-9955-40B5-B1E8-AE673E849DAF}"/>
+          </ac:picMkLst>
+        </pc:picChg>
+      </pc:sldChg>
+      <pc:sldChg chg="delSp modAnim">
+        <pc:chgData name="Christel Maes" userId="7e61469a-7c21-464c-bace-a1bda262211a" providerId="ADAL" clId="{EB65D1DE-64AF-4D16-995F-1B7EFD43A975}" dt="2020-09-10T15:18:20.751" v="0"/>
+        <pc:sldMkLst>
+          <pc:docMk/>
+          <pc:sldMk cId="76180516" sldId="284"/>
+        </pc:sldMkLst>
+        <pc:picChg chg="del">
+          <ac:chgData name="Christel Maes" userId="7e61469a-7c21-464c-bace-a1bda262211a" providerId="ADAL" clId="{EB65D1DE-64AF-4D16-995F-1B7EFD43A975}" dt="2020-09-10T15:18:20.751" v="0"/>
+          <ac:picMkLst>
+            <pc:docMk/>
+            <pc:sldMk cId="76180516" sldId="284"/>
+            <ac:picMk id="4" creationId="{A560FBB7-8DE9-495E-A9F3-B55CDA3E9642}"/>
+          </ac:picMkLst>
+        </pc:picChg>
+      </pc:sldChg>
+      <pc:sldChg chg="delSp modAnim">
+        <pc:chgData name="Christel Maes" userId="7e61469a-7c21-464c-bace-a1bda262211a" providerId="ADAL" clId="{EB65D1DE-64AF-4D16-995F-1B7EFD43A975}" dt="2020-09-10T15:18:20.751" v="0"/>
+        <pc:sldMkLst>
+          <pc:docMk/>
+          <pc:sldMk cId="59728421" sldId="285"/>
+        </pc:sldMkLst>
+        <pc:picChg chg="del">
+          <ac:chgData name="Christel Maes" userId="7e61469a-7c21-464c-bace-a1bda262211a" providerId="ADAL" clId="{EB65D1DE-64AF-4D16-995F-1B7EFD43A975}" dt="2020-09-10T15:18:20.751" v="0"/>
+          <ac:picMkLst>
+            <pc:docMk/>
+            <pc:sldMk cId="59728421" sldId="285"/>
+            <ac:picMk id="5" creationId="{61CFACFB-91B7-427D-96E3-A0E5C1BC614C}"/>
+          </ac:picMkLst>
+        </pc:picChg>
+      </pc:sldChg>
+      <pc:sldChg chg="delSp modAnim">
+        <pc:chgData name="Christel Maes" userId="7e61469a-7c21-464c-bace-a1bda262211a" providerId="ADAL" clId="{EB65D1DE-64AF-4D16-995F-1B7EFD43A975}" dt="2020-09-10T15:18:20.751" v="0"/>
+        <pc:sldMkLst>
+          <pc:docMk/>
+          <pc:sldMk cId="4200910606" sldId="286"/>
+        </pc:sldMkLst>
+        <pc:picChg chg="del">
+          <ac:chgData name="Christel Maes" userId="7e61469a-7c21-464c-bace-a1bda262211a" providerId="ADAL" clId="{EB65D1DE-64AF-4D16-995F-1B7EFD43A975}" dt="2020-09-10T15:18:20.751" v="0"/>
+          <ac:picMkLst>
+            <pc:docMk/>
+            <pc:sldMk cId="4200910606" sldId="286"/>
+            <ac:picMk id="4" creationId="{836E1F73-F995-4187-9C96-B9C57F95F24D}"/>
+          </ac:picMkLst>
+        </pc:picChg>
+      </pc:sldChg>
+      <pc:sldChg chg="delSp modAnim">
+        <pc:chgData name="Christel Maes" userId="7e61469a-7c21-464c-bace-a1bda262211a" providerId="ADAL" clId="{EB65D1DE-64AF-4D16-995F-1B7EFD43A975}" dt="2020-09-10T15:18:20.751" v="0"/>
+        <pc:sldMkLst>
+          <pc:docMk/>
+          <pc:sldMk cId="4009331374" sldId="287"/>
+        </pc:sldMkLst>
+        <pc:picChg chg="del">
+          <ac:chgData name="Christel Maes" userId="7e61469a-7c21-464c-bace-a1bda262211a" providerId="ADAL" clId="{EB65D1DE-64AF-4D16-995F-1B7EFD43A975}" dt="2020-09-10T15:18:20.751" v="0"/>
+          <ac:picMkLst>
+            <pc:docMk/>
+            <pc:sldMk cId="4009331374" sldId="287"/>
+            <ac:picMk id="6" creationId="{E4AB014E-6230-4398-A738-301FCC8C9508}"/>
+          </ac:picMkLst>
+        </pc:picChg>
+      </pc:sldChg>
+      <pc:sldChg chg="delSp modAnim">
+        <pc:chgData name="Christel Maes" userId="7e61469a-7c21-464c-bace-a1bda262211a" providerId="ADAL" clId="{EB65D1DE-64AF-4D16-995F-1B7EFD43A975}" dt="2020-09-10T15:18:20.751" v="0"/>
+        <pc:sldMkLst>
+          <pc:docMk/>
+          <pc:sldMk cId="43088005" sldId="288"/>
+        </pc:sldMkLst>
+        <pc:picChg chg="del">
+          <ac:chgData name="Christel Maes" userId="7e61469a-7c21-464c-bace-a1bda262211a" providerId="ADAL" clId="{EB65D1DE-64AF-4D16-995F-1B7EFD43A975}" dt="2020-09-10T15:18:20.751" v="0"/>
+          <ac:picMkLst>
+            <pc:docMk/>
+            <pc:sldMk cId="43088005" sldId="288"/>
+            <ac:picMk id="4" creationId="{32CDA107-55C4-4228-AB6C-3C22F7EE869B}"/>
+          </ac:picMkLst>
+        </pc:picChg>
+      </pc:sldChg>
+      <pc:sldChg chg="delSp modAnim">
+        <pc:chgData name="Christel Maes" userId="7e61469a-7c21-464c-bace-a1bda262211a" providerId="ADAL" clId="{EB65D1DE-64AF-4D16-995F-1B7EFD43A975}" dt="2020-09-10T15:18:20.751" v="0"/>
+        <pc:sldMkLst>
+          <pc:docMk/>
+          <pc:sldMk cId="1022641883" sldId="289"/>
+        </pc:sldMkLst>
+        <pc:picChg chg="del">
+          <ac:chgData name="Christel Maes" userId="7e61469a-7c21-464c-bace-a1bda262211a" providerId="ADAL" clId="{EB65D1DE-64AF-4D16-995F-1B7EFD43A975}" dt="2020-09-10T15:18:20.751" v="0"/>
+          <ac:picMkLst>
+            <pc:docMk/>
+            <pc:sldMk cId="1022641883" sldId="289"/>
+            <ac:picMk id="13" creationId="{6B7689E5-DEA6-444A-84F3-B464EDE5819B}"/>
+          </ac:picMkLst>
+        </pc:picChg>
+      </pc:sldChg>
+      <pc:sldChg chg="delSp modAnim">
+        <pc:chgData name="Christel Maes" userId="7e61469a-7c21-464c-bace-a1bda262211a" providerId="ADAL" clId="{EB65D1DE-64AF-4D16-995F-1B7EFD43A975}" dt="2020-09-10T15:18:20.751" v="0"/>
+        <pc:sldMkLst>
+          <pc:docMk/>
+          <pc:sldMk cId="4294783759" sldId="290"/>
+        </pc:sldMkLst>
+        <pc:picChg chg="del">
+          <ac:chgData name="Christel Maes" userId="7e61469a-7c21-464c-bace-a1bda262211a" providerId="ADAL" clId="{EB65D1DE-64AF-4D16-995F-1B7EFD43A975}" dt="2020-09-10T15:18:20.751" v="0"/>
+          <ac:picMkLst>
+            <pc:docMk/>
+            <pc:sldMk cId="4294783759" sldId="290"/>
+            <ac:picMk id="4" creationId="{8B6BB2F0-DF92-4E24-810D-1DC61B07C77D}"/>
+          </ac:picMkLst>
+        </pc:picChg>
+      </pc:sldChg>
+      <pc:sldChg chg="delSp modAnim">
+        <pc:chgData name="Christel Maes" userId="7e61469a-7c21-464c-bace-a1bda262211a" providerId="ADAL" clId="{EB65D1DE-64AF-4D16-995F-1B7EFD43A975}" dt="2020-09-10T15:18:20.751" v="0"/>
+        <pc:sldMkLst>
+          <pc:docMk/>
+          <pc:sldMk cId="2357875275" sldId="294"/>
+        </pc:sldMkLst>
+        <pc:picChg chg="del">
+          <ac:chgData name="Christel Maes" userId="7e61469a-7c21-464c-bace-a1bda262211a" providerId="ADAL" clId="{EB65D1DE-64AF-4D16-995F-1B7EFD43A975}" dt="2020-09-10T15:18:20.751" v="0"/>
+          <ac:picMkLst>
+            <pc:docMk/>
+            <pc:sldMk cId="2357875275" sldId="294"/>
+            <ac:picMk id="7" creationId="{CA2B6B1F-C17D-4223-A77D-23EF65DD0F69}"/>
+          </ac:picMkLst>
+        </pc:picChg>
+      </pc:sldChg>
+      <pc:sldChg chg="delSp modAnim">
+        <pc:chgData name="Christel Maes" userId="7e61469a-7c21-464c-bace-a1bda262211a" providerId="ADAL" clId="{EB65D1DE-64AF-4D16-995F-1B7EFD43A975}" dt="2020-09-10T15:18:20.751" v="0"/>
+        <pc:sldMkLst>
+          <pc:docMk/>
+          <pc:sldMk cId="2904059153" sldId="295"/>
+        </pc:sldMkLst>
+        <pc:picChg chg="del">
+          <ac:chgData name="Christel Maes" userId="7e61469a-7c21-464c-bace-a1bda262211a" providerId="ADAL" clId="{EB65D1DE-64AF-4D16-995F-1B7EFD43A975}" dt="2020-09-10T15:18:20.751" v="0"/>
+          <ac:picMkLst>
+            <pc:docMk/>
+            <pc:sldMk cId="2904059153" sldId="295"/>
+            <ac:picMk id="5" creationId="{4BC0FC2C-D5CE-41CF-B3BC-975D8BCEC7FE}"/>
+          </ac:picMkLst>
+        </pc:picChg>
+      </pc:sldChg>
+      <pc:sldChg chg="delSp modAnim">
+        <pc:chgData name="Christel Maes" userId="7e61469a-7c21-464c-bace-a1bda262211a" providerId="ADAL" clId="{EB65D1DE-64AF-4D16-995F-1B7EFD43A975}" dt="2020-09-10T15:18:20.751" v="0"/>
+        <pc:sldMkLst>
+          <pc:docMk/>
+          <pc:sldMk cId="1956145419" sldId="296"/>
+        </pc:sldMkLst>
+        <pc:picChg chg="del">
+          <ac:chgData name="Christel Maes" userId="7e61469a-7c21-464c-bace-a1bda262211a" providerId="ADAL" clId="{EB65D1DE-64AF-4D16-995F-1B7EFD43A975}" dt="2020-09-10T15:18:20.751" v="0"/>
+          <ac:picMkLst>
+            <pc:docMk/>
+            <pc:sldMk cId="1956145419" sldId="296"/>
+            <ac:picMk id="4" creationId="{042F7D24-6047-451A-B197-B848E7ABD78C}"/>
+          </ac:picMkLst>
+        </pc:picChg>
+      </pc:sldChg>
+      <pc:sldChg chg="delSp modAnim">
+        <pc:chgData name="Christel Maes" userId="7e61469a-7c21-464c-bace-a1bda262211a" providerId="ADAL" clId="{EB65D1DE-64AF-4D16-995F-1B7EFD43A975}" dt="2020-09-10T15:18:20.751" v="0"/>
+        <pc:sldMkLst>
+          <pc:docMk/>
+          <pc:sldMk cId="1613200239" sldId="297"/>
+        </pc:sldMkLst>
+        <pc:picChg chg="del">
+          <ac:chgData name="Christel Maes" userId="7e61469a-7c21-464c-bace-a1bda262211a" providerId="ADAL" clId="{EB65D1DE-64AF-4D16-995F-1B7EFD43A975}" dt="2020-09-10T15:18:20.751" v="0"/>
+          <ac:picMkLst>
+            <pc:docMk/>
+            <pc:sldMk cId="1613200239" sldId="297"/>
+            <ac:picMk id="6" creationId="{578F5165-0E94-410F-8670-024099FBE299}"/>
+          </ac:picMkLst>
+        </pc:picChg>
+      </pc:sldChg>
+      <pc:sldChg chg="delSp modAnim">
+        <pc:chgData name="Christel Maes" userId="7e61469a-7c21-464c-bace-a1bda262211a" providerId="ADAL" clId="{EB65D1DE-64AF-4D16-995F-1B7EFD43A975}" dt="2020-09-10T15:18:20.751" v="0"/>
+        <pc:sldMkLst>
+          <pc:docMk/>
+          <pc:sldMk cId="3876857091" sldId="298"/>
+        </pc:sldMkLst>
+        <pc:picChg chg="del">
+          <ac:chgData name="Christel Maes" userId="7e61469a-7c21-464c-bace-a1bda262211a" providerId="ADAL" clId="{EB65D1DE-64AF-4D16-995F-1B7EFD43A975}" dt="2020-09-10T15:18:20.751" v="0"/>
+          <ac:picMkLst>
+            <pc:docMk/>
+            <pc:sldMk cId="3876857091" sldId="298"/>
+            <ac:picMk id="9" creationId="{161EBFA7-41BA-4A60-8B43-3309183B65CD}"/>
+          </ac:picMkLst>
+        </pc:picChg>
+      </pc:sldChg>
+      <pc:sldChg chg="delSp modAnim">
+        <pc:chgData name="Christel Maes" userId="7e61469a-7c21-464c-bace-a1bda262211a" providerId="ADAL" clId="{EB65D1DE-64AF-4D16-995F-1B7EFD43A975}" dt="2020-09-10T15:18:20.751" v="0"/>
+        <pc:sldMkLst>
+          <pc:docMk/>
+          <pc:sldMk cId="2167334292" sldId="299"/>
+        </pc:sldMkLst>
+        <pc:picChg chg="del">
+          <ac:chgData name="Christel Maes" userId="7e61469a-7c21-464c-bace-a1bda262211a" providerId="ADAL" clId="{EB65D1DE-64AF-4D16-995F-1B7EFD43A975}" dt="2020-09-10T15:18:20.751" v="0"/>
+          <ac:picMkLst>
+            <pc:docMk/>
+            <pc:sldMk cId="2167334292" sldId="299"/>
+            <ac:picMk id="6" creationId="{0F836460-A743-4E1A-83F5-826EC1F5F744}"/>
+          </ac:picMkLst>
+        </pc:picChg>
+      </pc:sldChg>
+      <pc:sldChg chg="delSp modAnim">
+        <pc:chgData name="Christel Maes" userId="7e61469a-7c21-464c-bace-a1bda262211a" providerId="ADAL" clId="{EB65D1DE-64AF-4D16-995F-1B7EFD43A975}" dt="2020-09-10T15:18:20.751" v="0"/>
+        <pc:sldMkLst>
+          <pc:docMk/>
+          <pc:sldMk cId="524085819" sldId="302"/>
+        </pc:sldMkLst>
+        <pc:picChg chg="del">
+          <ac:chgData name="Christel Maes" userId="7e61469a-7c21-464c-bace-a1bda262211a" providerId="ADAL" clId="{EB65D1DE-64AF-4D16-995F-1B7EFD43A975}" dt="2020-09-10T15:18:20.751" v="0"/>
+          <ac:picMkLst>
+            <pc:docMk/>
+            <pc:sldMk cId="524085819" sldId="302"/>
+            <ac:picMk id="3" creationId="{66DBF5A9-B2D8-4C8A-ADC5-A75CBF49A5B6}"/>
+          </ac:picMkLst>
+        </pc:picChg>
+      </pc:sldChg>
+      <pc:sldChg chg="delSp modAnim">
+        <pc:chgData name="Christel Maes" userId="7e61469a-7c21-464c-bace-a1bda262211a" providerId="ADAL" clId="{EB65D1DE-64AF-4D16-995F-1B7EFD43A975}" dt="2020-09-10T15:18:20.751" v="0"/>
+        <pc:sldMkLst>
+          <pc:docMk/>
+          <pc:sldMk cId="2011064558" sldId="303"/>
+        </pc:sldMkLst>
+        <pc:picChg chg="del">
+          <ac:chgData name="Christel Maes" userId="7e61469a-7c21-464c-bace-a1bda262211a" providerId="ADAL" clId="{EB65D1DE-64AF-4D16-995F-1B7EFD43A975}" dt="2020-09-10T15:18:20.751" v="0"/>
+          <ac:picMkLst>
+            <pc:docMk/>
+            <pc:sldMk cId="2011064558" sldId="303"/>
+            <ac:picMk id="6" creationId="{376C2BBB-5F49-49BA-B31C-86717C33E15C}"/>
+          </ac:picMkLst>
+        </pc:picChg>
+      </pc:sldChg>
+      <pc:sldChg chg="delSp modAnim">
+        <pc:chgData name="Christel Maes" userId="7e61469a-7c21-464c-bace-a1bda262211a" providerId="ADAL" clId="{EB65D1DE-64AF-4D16-995F-1B7EFD43A975}" dt="2020-09-10T15:18:20.751" v="0"/>
+        <pc:sldMkLst>
+          <pc:docMk/>
+          <pc:sldMk cId="3814101728" sldId="304"/>
+        </pc:sldMkLst>
+        <pc:picChg chg="del">
+          <ac:chgData name="Christel Maes" userId="7e61469a-7c21-464c-bace-a1bda262211a" providerId="ADAL" clId="{EB65D1DE-64AF-4D16-995F-1B7EFD43A975}" dt="2020-09-10T15:18:20.751" v="0"/>
+          <ac:picMkLst>
+            <pc:docMk/>
+            <pc:sldMk cId="3814101728" sldId="304"/>
+            <ac:picMk id="10" creationId="{EC6FB4AD-E37D-45BB-8DB6-445426C80C41}"/>
+          </ac:picMkLst>
+        </pc:picChg>
+      </pc:sldChg>
+      <pc:sldChg chg="delSp modAnim">
+        <pc:chgData name="Christel Maes" userId="7e61469a-7c21-464c-bace-a1bda262211a" providerId="ADAL" clId="{EB65D1DE-64AF-4D16-995F-1B7EFD43A975}" dt="2020-09-10T15:18:20.751" v="0"/>
+        <pc:sldMkLst>
+          <pc:docMk/>
+          <pc:sldMk cId="1088796419" sldId="305"/>
+        </pc:sldMkLst>
+        <pc:picChg chg="del">
+          <ac:chgData name="Christel Maes" userId="7e61469a-7c21-464c-bace-a1bda262211a" providerId="ADAL" clId="{EB65D1DE-64AF-4D16-995F-1B7EFD43A975}" dt="2020-09-10T15:18:20.751" v="0"/>
+          <ac:picMkLst>
+            <pc:docMk/>
+            <pc:sldMk cId="1088796419" sldId="305"/>
+            <ac:picMk id="6" creationId="{4BB5761A-3330-408A-A769-03A56FF8FBCB}"/>
+          </ac:picMkLst>
+        </pc:picChg>
+      </pc:sldChg>
+      <pc:sldChg chg="delSp modAnim">
+        <pc:chgData name="Christel Maes" userId="7e61469a-7c21-464c-bace-a1bda262211a" providerId="ADAL" clId="{EB65D1DE-64AF-4D16-995F-1B7EFD43A975}" dt="2020-09-10T15:18:20.751" v="0"/>
+        <pc:sldMkLst>
+          <pc:docMk/>
+          <pc:sldMk cId="2208920561" sldId="306"/>
+        </pc:sldMkLst>
+        <pc:picChg chg="del">
+          <ac:chgData name="Christel Maes" userId="7e61469a-7c21-464c-bace-a1bda262211a" providerId="ADAL" clId="{EB65D1DE-64AF-4D16-995F-1B7EFD43A975}" dt="2020-09-10T15:18:20.751" v="0"/>
+          <ac:picMkLst>
+            <pc:docMk/>
+            <pc:sldMk cId="2208920561" sldId="306"/>
+            <ac:picMk id="6" creationId="{C9CBF085-0EB7-4349-A33E-D1A0778ECE35}"/>
+          </ac:picMkLst>
+        </pc:picChg>
+      </pc:sldChg>
+      <pc:sldChg chg="delSp modAnim">
+        <pc:chgData name="Christel Maes" userId="7e61469a-7c21-464c-bace-a1bda262211a" providerId="ADAL" clId="{EB65D1DE-64AF-4D16-995F-1B7EFD43A975}" dt="2020-09-10T15:18:20.751" v="0"/>
+        <pc:sldMkLst>
+          <pc:docMk/>
+          <pc:sldMk cId="911337620" sldId="307"/>
+        </pc:sldMkLst>
+        <pc:picChg chg="del">
+          <ac:chgData name="Christel Maes" userId="7e61469a-7c21-464c-bace-a1bda262211a" providerId="ADAL" clId="{EB65D1DE-64AF-4D16-995F-1B7EFD43A975}" dt="2020-09-10T15:18:20.751" v="0"/>
+          <ac:picMkLst>
+            <pc:docMk/>
+            <pc:sldMk cId="911337620" sldId="307"/>
+            <ac:picMk id="7" creationId="{563B672A-B6AA-4F1E-9EAB-9EA61F54A5F2}"/>
+          </ac:picMkLst>
+        </pc:picChg>
+      </pc:sldChg>
+      <pc:sldChg chg="delSp modAnim">
+        <pc:chgData name="Christel Maes" userId="7e61469a-7c21-464c-bace-a1bda262211a" providerId="ADAL" clId="{EB65D1DE-64AF-4D16-995F-1B7EFD43A975}" dt="2020-09-10T15:18:20.751" v="0"/>
+        <pc:sldMkLst>
+          <pc:docMk/>
+          <pc:sldMk cId="46570853" sldId="308"/>
+        </pc:sldMkLst>
+        <pc:picChg chg="del">
+          <ac:chgData name="Christel Maes" userId="7e61469a-7c21-464c-bace-a1bda262211a" providerId="ADAL" clId="{EB65D1DE-64AF-4D16-995F-1B7EFD43A975}" dt="2020-09-10T15:18:20.751" v="0"/>
+          <ac:picMkLst>
+            <pc:docMk/>
+            <pc:sldMk cId="46570853" sldId="308"/>
+            <ac:picMk id="6" creationId="{B52DED2E-62F4-480E-A87E-BD20EFDB5B7E}"/>
+          </ac:picMkLst>
+        </pc:picChg>
+      </pc:sldChg>
+      <pc:sldChg chg="delSp modAnim">
+        <pc:chgData name="Christel Maes" userId="7e61469a-7c21-464c-bace-a1bda262211a" providerId="ADAL" clId="{EB65D1DE-64AF-4D16-995F-1B7EFD43A975}" dt="2020-09-10T15:18:20.751" v="0"/>
+        <pc:sldMkLst>
+          <pc:docMk/>
+          <pc:sldMk cId="2531460558" sldId="309"/>
+        </pc:sldMkLst>
+        <pc:picChg chg="del">
+          <ac:chgData name="Christel Maes" userId="7e61469a-7c21-464c-bace-a1bda262211a" providerId="ADAL" clId="{EB65D1DE-64AF-4D16-995F-1B7EFD43A975}" dt="2020-09-10T15:18:20.751" v="0"/>
+          <ac:picMkLst>
+            <pc:docMk/>
+            <pc:sldMk cId="2531460558" sldId="309"/>
+            <ac:picMk id="5" creationId="{7B3ECFD4-D92A-48D2-9D96-16599C777729}"/>
+          </ac:picMkLst>
+        </pc:picChg>
+      </pc:sldChg>
+      <pc:sldChg chg="delSp modAnim">
+        <pc:chgData name="Christel Maes" userId="7e61469a-7c21-464c-bace-a1bda262211a" providerId="ADAL" clId="{EB65D1DE-64AF-4D16-995F-1B7EFD43A975}" dt="2020-09-10T15:18:20.751" v="0"/>
+        <pc:sldMkLst>
+          <pc:docMk/>
+          <pc:sldMk cId="3374308686" sldId="310"/>
+        </pc:sldMkLst>
+        <pc:picChg chg="del">
+          <ac:chgData name="Christel Maes" userId="7e61469a-7c21-464c-bace-a1bda262211a" providerId="ADAL" clId="{EB65D1DE-64AF-4D16-995F-1B7EFD43A975}" dt="2020-09-10T15:18:20.751" v="0"/>
+          <ac:picMkLst>
+            <pc:docMk/>
+            <pc:sldMk cId="3374308686" sldId="310"/>
+            <ac:picMk id="6" creationId="{6B80F56A-1D17-4FC1-8325-EAF17FE72FC6}"/>
+          </ac:picMkLst>
+        </pc:picChg>
+      </pc:sldChg>
+      <pc:sldChg chg="delSp modAnim">
+        <pc:chgData name="Christel Maes" userId="7e61469a-7c21-464c-bace-a1bda262211a" providerId="ADAL" clId="{EB65D1DE-64AF-4D16-995F-1B7EFD43A975}" dt="2020-09-10T15:18:20.751" v="0"/>
+        <pc:sldMkLst>
+          <pc:docMk/>
+          <pc:sldMk cId="2488015683" sldId="311"/>
+        </pc:sldMkLst>
+        <pc:picChg chg="del">
+          <ac:chgData name="Christel Maes" userId="7e61469a-7c21-464c-bace-a1bda262211a" providerId="ADAL" clId="{EB65D1DE-64AF-4D16-995F-1B7EFD43A975}" dt="2020-09-10T15:18:20.751" v="0"/>
+          <ac:picMkLst>
+            <pc:docMk/>
+            <pc:sldMk cId="2488015683" sldId="311"/>
+            <ac:picMk id="7" creationId="{861296E5-5918-42F6-AF29-34A207BF5561}"/>
+          </ac:picMkLst>
+        </pc:picChg>
+      </pc:sldChg>
+      <pc:sldChg chg="delSp modAnim">
+        <pc:chgData name="Christel Maes" userId="7e61469a-7c21-464c-bace-a1bda262211a" providerId="ADAL" clId="{EB65D1DE-64AF-4D16-995F-1B7EFD43A975}" dt="2020-09-10T15:18:20.751" v="0"/>
+        <pc:sldMkLst>
+          <pc:docMk/>
+          <pc:sldMk cId="1517140393" sldId="312"/>
+        </pc:sldMkLst>
+        <pc:picChg chg="del">
+          <ac:chgData name="Christel Maes" userId="7e61469a-7c21-464c-bace-a1bda262211a" providerId="ADAL" clId="{EB65D1DE-64AF-4D16-995F-1B7EFD43A975}" dt="2020-09-10T15:18:20.751" v="0"/>
+          <ac:picMkLst>
+            <pc:docMk/>
+            <pc:sldMk cId="1517140393" sldId="312"/>
+            <ac:picMk id="8" creationId="{A092BC04-274B-4CE4-B0F4-022C40A1245F}"/>
+          </ac:picMkLst>
+        </pc:picChg>
+      </pc:sldChg>
+      <pc:sldChg chg="delSp modAnim">
+        <pc:chgData name="Christel Maes" userId="7e61469a-7c21-464c-bace-a1bda262211a" providerId="ADAL" clId="{EB65D1DE-64AF-4D16-995F-1B7EFD43A975}" dt="2020-09-10T15:18:20.751" v="0"/>
+        <pc:sldMkLst>
+          <pc:docMk/>
+          <pc:sldMk cId="4048209516" sldId="313"/>
+        </pc:sldMkLst>
+        <pc:picChg chg="del">
+          <ac:chgData name="Christel Maes" userId="7e61469a-7c21-464c-bace-a1bda262211a" providerId="ADAL" clId="{EB65D1DE-64AF-4D16-995F-1B7EFD43A975}" dt="2020-09-10T15:18:20.751" v="0"/>
+          <ac:picMkLst>
+            <pc:docMk/>
+            <pc:sldMk cId="4048209516" sldId="313"/>
+            <ac:picMk id="6" creationId="{D7710C24-73D8-40F6-8BDE-7B1F33D77A80}"/>
+          </ac:picMkLst>
+        </pc:picChg>
+      </pc:sldChg>
+      <pc:sldChg chg="delSp modAnim">
+        <pc:chgData name="Christel Maes" userId="7e61469a-7c21-464c-bace-a1bda262211a" providerId="ADAL" clId="{EB65D1DE-64AF-4D16-995F-1B7EFD43A975}" dt="2020-09-10T15:18:20.751" v="0"/>
+        <pc:sldMkLst>
+          <pc:docMk/>
+          <pc:sldMk cId="3024926684" sldId="314"/>
+        </pc:sldMkLst>
+        <pc:picChg chg="del">
+          <ac:chgData name="Christel Maes" userId="7e61469a-7c21-464c-bace-a1bda262211a" providerId="ADAL" clId="{EB65D1DE-64AF-4D16-995F-1B7EFD43A975}" dt="2020-09-10T15:18:20.751" v="0"/>
+          <ac:picMkLst>
+            <pc:docMk/>
+            <pc:sldMk cId="3024926684" sldId="314"/>
+            <ac:picMk id="6" creationId="{9BAFFC1D-00FC-49C9-8F7E-A47E2036D0A5}"/>
+          </ac:picMkLst>
+        </pc:picChg>
+      </pc:sldChg>
+      <pc:sldChg chg="delSp modAnim">
+        <pc:chgData name="Christel Maes" userId="7e61469a-7c21-464c-bace-a1bda262211a" providerId="ADAL" clId="{EB65D1DE-64AF-4D16-995F-1B7EFD43A975}" dt="2020-09-10T15:18:20.751" v="0"/>
+        <pc:sldMkLst>
+          <pc:docMk/>
+          <pc:sldMk cId="1078311508" sldId="315"/>
+        </pc:sldMkLst>
+        <pc:picChg chg="del">
+          <ac:chgData name="Christel Maes" userId="7e61469a-7c21-464c-bace-a1bda262211a" providerId="ADAL" clId="{EB65D1DE-64AF-4D16-995F-1B7EFD43A975}" dt="2020-09-10T15:18:20.751" v="0"/>
+          <ac:picMkLst>
+            <pc:docMk/>
+            <pc:sldMk cId="1078311508" sldId="315"/>
+            <ac:picMk id="6" creationId="{A20B327A-7146-4AFE-AE51-C590E0B0F427}"/>
+          </ac:picMkLst>
+        </pc:picChg>
+      </pc:sldChg>
+      <pc:sldChg chg="delSp modAnim">
+        <pc:chgData name="Christel Maes" userId="7e61469a-7c21-464c-bace-a1bda262211a" providerId="ADAL" clId="{EB65D1DE-64AF-4D16-995F-1B7EFD43A975}" dt="2020-09-10T15:18:20.751" v="0"/>
+        <pc:sldMkLst>
+          <pc:docMk/>
+          <pc:sldMk cId="1205063951" sldId="316"/>
+        </pc:sldMkLst>
+        <pc:picChg chg="del">
+          <ac:chgData name="Christel Maes" userId="7e61469a-7c21-464c-bace-a1bda262211a" providerId="ADAL" clId="{EB65D1DE-64AF-4D16-995F-1B7EFD43A975}" dt="2020-09-10T15:18:20.751" v="0"/>
+          <ac:picMkLst>
+            <pc:docMk/>
+            <pc:sldMk cId="1205063951" sldId="316"/>
+            <ac:picMk id="14" creationId="{0CCC36B1-450B-4D1D-AE41-0F103B228459}"/>
+          </ac:picMkLst>
+        </pc:picChg>
+      </pc:sldChg>
+    </pc:docChg>
+  </pc:docChgLst>
+  <pc:docChgLst>
     <pc:chgData name="Tinne Van Echelpoel" userId="46798032-b7e2-4f2e-95a1-1606ec8c5d9a" providerId="ADAL" clId="{61EE40E9-0D45-4881-AF86-6F7CA84DA927}"/>
     <pc:docChg chg="undo custSel modSld">
       <pc:chgData name="Tinne Van Echelpoel" userId="46798032-b7e2-4f2e-95a1-1606ec8c5d9a" providerId="ADAL" clId="{61EE40E9-0D45-4881-AF86-6F7CA84DA927}" dt="2020-08-26T14:17:26.360" v="570" actId="20577"/>
@@ -4424,6 +4267,83 @@
     </pc:docChg>
   </pc:docChgLst>
   <pc:docChgLst>
+    <pc:chgData name="Christel Maes" userId="7e61469a-7c21-464c-bace-a1bda262211a" providerId="ADAL" clId="{B5CD5A5B-23BA-40C5-AEF0-16AE51DB6A5A}"/>
+    <pc:docChg chg="undo custSel modSld modShowInfo">
+      <pc:chgData name="Christel Maes" userId="7e61469a-7c21-464c-bace-a1bda262211a" providerId="ADAL" clId="{B5CD5A5B-23BA-40C5-AEF0-16AE51DB6A5A}" dt="2020-09-21T07:08:55.042" v="15" actId="2744"/>
+      <pc:docMkLst>
+        <pc:docMk/>
+      </pc:docMkLst>
+      <pc:sldChg chg="modSp mod">
+        <pc:chgData name="Christel Maes" userId="7e61469a-7c21-464c-bace-a1bda262211a" providerId="ADAL" clId="{B5CD5A5B-23BA-40C5-AEF0-16AE51DB6A5A}" dt="2020-09-20T09:40:04.058" v="11" actId="20577"/>
+        <pc:sldMkLst>
+          <pc:docMk/>
+          <pc:sldMk cId="59728421" sldId="285"/>
+        </pc:sldMkLst>
+        <pc:graphicFrameChg chg="modGraphic">
+          <ac:chgData name="Christel Maes" userId="7e61469a-7c21-464c-bace-a1bda262211a" providerId="ADAL" clId="{B5CD5A5B-23BA-40C5-AEF0-16AE51DB6A5A}" dt="2020-09-20T09:40:04.058" v="11" actId="20577"/>
+          <ac:graphicFrameMkLst>
+            <pc:docMk/>
+            <pc:sldMk cId="59728421" sldId="285"/>
+            <ac:graphicFrameMk id="4" creationId="{D26B8449-CAA6-4957-BFBF-58850FD4FB01}"/>
+          </ac:graphicFrameMkLst>
+        </pc:graphicFrameChg>
+      </pc:sldChg>
+      <pc:sldChg chg="delSp modSp mod">
+        <pc:chgData name="Christel Maes" userId="7e61469a-7c21-464c-bace-a1bda262211a" providerId="ADAL" clId="{B5CD5A5B-23BA-40C5-AEF0-16AE51DB6A5A}" dt="2020-09-20T09:39:54.092" v="10" actId="478"/>
+        <pc:sldMkLst>
+          <pc:docMk/>
+          <pc:sldMk cId="43088005" sldId="288"/>
+        </pc:sldMkLst>
+        <pc:spChg chg="del">
+          <ac:chgData name="Christel Maes" userId="7e61469a-7c21-464c-bace-a1bda262211a" providerId="ADAL" clId="{B5CD5A5B-23BA-40C5-AEF0-16AE51DB6A5A}" dt="2020-09-20T09:39:54.092" v="10" actId="478"/>
+          <ac:spMkLst>
+            <pc:docMk/>
+            <pc:sldMk cId="43088005" sldId="288"/>
+            <ac:spMk id="5" creationId="{FE28E44A-73DE-43BA-9A30-BE8CEDD91E39}"/>
+          </ac:spMkLst>
+        </pc:spChg>
+        <pc:spChg chg="mod">
+          <ac:chgData name="Christel Maes" userId="7e61469a-7c21-464c-bace-a1bda262211a" providerId="ADAL" clId="{B5CD5A5B-23BA-40C5-AEF0-16AE51DB6A5A}" dt="2020-09-20T09:37:25.963" v="9" actId="20577"/>
+          <ac:spMkLst>
+            <pc:docMk/>
+            <pc:sldMk cId="43088005" sldId="288"/>
+            <ac:spMk id="494594" creationId="{00000000-0000-0000-0000-000000000000}"/>
+          </ac:spMkLst>
+        </pc:spChg>
+      </pc:sldChg>
+      <pc:sldChg chg="modSp mod">
+        <pc:chgData name="Christel Maes" userId="7e61469a-7c21-464c-bace-a1bda262211a" providerId="ADAL" clId="{B5CD5A5B-23BA-40C5-AEF0-16AE51DB6A5A}" dt="2020-09-20T09:42:09.769" v="14" actId="313"/>
+        <pc:sldMkLst>
+          <pc:docMk/>
+          <pc:sldMk cId="2167334292" sldId="299"/>
+        </pc:sldMkLst>
+        <pc:spChg chg="mod">
+          <ac:chgData name="Christel Maes" userId="7e61469a-7c21-464c-bace-a1bda262211a" providerId="ADAL" clId="{B5CD5A5B-23BA-40C5-AEF0-16AE51DB6A5A}" dt="2020-09-20T09:42:09.769" v="14" actId="313"/>
+          <ac:spMkLst>
+            <pc:docMk/>
+            <pc:sldMk cId="2167334292" sldId="299"/>
+            <ac:spMk id="5" creationId="{00000000-0000-0000-0000-000000000000}"/>
+          </ac:spMkLst>
+        </pc:spChg>
+      </pc:sldChg>
+      <pc:sldChg chg="modSp mod">
+        <pc:chgData name="Christel Maes" userId="7e61469a-7c21-464c-bace-a1bda262211a" providerId="ADAL" clId="{B5CD5A5B-23BA-40C5-AEF0-16AE51DB6A5A}" dt="2020-09-18T13:00:48.912" v="1" actId="207"/>
+        <pc:sldMkLst>
+          <pc:docMk/>
+          <pc:sldMk cId="2208920561" sldId="306"/>
+        </pc:sldMkLst>
+        <pc:spChg chg="mod">
+          <ac:chgData name="Christel Maes" userId="7e61469a-7c21-464c-bace-a1bda262211a" providerId="ADAL" clId="{B5CD5A5B-23BA-40C5-AEF0-16AE51DB6A5A}" dt="2020-09-18T13:00:48.912" v="1" actId="207"/>
+          <ac:spMkLst>
+            <pc:docMk/>
+            <pc:sldMk cId="2208920561" sldId="306"/>
+            <ac:spMk id="3" creationId="{00000000-0000-0000-0000-000000000000}"/>
+          </ac:spMkLst>
+        </pc:spChg>
+      </pc:sldChg>
+    </pc:docChg>
+  </pc:docChgLst>
+  <pc:docChgLst>
     <pc:chgData name="Tinne Van Echelpoel" userId="46798032-b7e2-4f2e-95a1-1606ec8c5d9a" providerId="ADAL" clId="{CF74617F-CC29-4BE4-A364-A57A02E95E0F}"/>
     <pc:docChg chg="custSel addSld modSld">
       <pc:chgData name="Tinne Van Echelpoel" userId="46798032-b7e2-4f2e-95a1-1606ec8c5d9a" providerId="ADAL" clId="{CF74617F-CC29-4BE4-A364-A57A02E95E0F}" dt="2021-08-23T09:02:19.327" v="241" actId="20577"/>
@@ -4495,32 +4415,173 @@
     </pc:docChg>
   </pc:docChgLst>
   <pc:docChgLst>
-    <pc:chgData name="Ellen Torfs" userId="c6aa1e10-4a12-4511-8c7c-135720d4f277" providerId="ADAL" clId="{E4105CDD-61A8-4CD5-A206-FD70DE250DC6}"/>
-    <pc:docChg chg="custSel modSld">
-      <pc:chgData name="Ellen Torfs" userId="c6aa1e10-4a12-4511-8c7c-135720d4f277" providerId="ADAL" clId="{E4105CDD-61A8-4CD5-A206-FD70DE250DC6}" dt="2021-09-06T11:46:51.654" v="4" actId="1076"/>
+    <pc:chgData name="Brent Pulmans" userId="8ae858ac-1a5b-43d2-9c3f-1bf2d06d427e" providerId="ADAL" clId="{EBCF9EDA-920A-43BC-A464-6C6D16ED0581}"/>
+    <pc:docChg chg="modSld">
+      <pc:chgData name="Brent Pulmans" userId="8ae858ac-1a5b-43d2-9c3f-1bf2d06d427e" providerId="ADAL" clId="{EBCF9EDA-920A-43BC-A464-6C6D16ED0581}" dt="2022-10-04T12:13:36.628" v="36" actId="20577"/>
       <pc:docMkLst>
         <pc:docMk/>
       </pc:docMkLst>
-      <pc:sldChg chg="addSp delSp modSp mod">
-        <pc:chgData name="Ellen Torfs" userId="c6aa1e10-4a12-4511-8c7c-135720d4f277" providerId="ADAL" clId="{E4105CDD-61A8-4CD5-A206-FD70DE250DC6}" dt="2021-09-06T11:46:51.654" v="4" actId="1076"/>
+      <pc:sldChg chg="modSp mod">
+        <pc:chgData name="Brent Pulmans" userId="8ae858ac-1a5b-43d2-9c3f-1bf2d06d427e" providerId="ADAL" clId="{EBCF9EDA-920A-43BC-A464-6C6D16ED0581}" dt="2022-10-04T11:27:06.560" v="0" actId="20577"/>
         <pc:sldMkLst>
           <pc:docMk/>
-          <pc:sldMk cId="2708364635" sldId="276"/>
+          <pc:sldMk cId="2718411288" sldId="270"/>
         </pc:sldMkLst>
+        <pc:spChg chg="mod">
+          <ac:chgData name="Brent Pulmans" userId="8ae858ac-1a5b-43d2-9c3f-1bf2d06d427e" providerId="ADAL" clId="{EBCF9EDA-920A-43BC-A464-6C6D16ED0581}" dt="2022-10-04T11:27:06.560" v="0" actId="20577"/>
+          <ac:spMkLst>
+            <pc:docMk/>
+            <pc:sldMk cId="2718411288" sldId="270"/>
+            <ac:spMk id="3" creationId="{00000000-0000-0000-0000-000000000000}"/>
+          </ac:spMkLst>
+        </pc:spChg>
+      </pc:sldChg>
+      <pc:sldChg chg="modSp mod">
+        <pc:chgData name="Brent Pulmans" userId="8ae858ac-1a5b-43d2-9c3f-1bf2d06d427e" providerId="ADAL" clId="{EBCF9EDA-920A-43BC-A464-6C6D16ED0581}" dt="2022-10-04T11:50:29.995" v="10" actId="20577"/>
+        <pc:sldMkLst>
+          <pc:docMk/>
+          <pc:sldMk cId="1022641883" sldId="289"/>
+        </pc:sldMkLst>
+        <pc:spChg chg="mod">
+          <ac:chgData name="Brent Pulmans" userId="8ae858ac-1a5b-43d2-9c3f-1bf2d06d427e" providerId="ADAL" clId="{EBCF9EDA-920A-43BC-A464-6C6D16ED0581}" dt="2022-10-04T11:50:29.995" v="10" actId="20577"/>
+          <ac:spMkLst>
+            <pc:docMk/>
+            <pc:sldMk cId="1022641883" sldId="289"/>
+            <ac:spMk id="3" creationId="{7BE69983-0622-4C95-9CB9-CE8C332EA738}"/>
+          </ac:spMkLst>
+        </pc:spChg>
+      </pc:sldChg>
+      <pc:sldChg chg="modSp mod">
+        <pc:chgData name="Brent Pulmans" userId="8ae858ac-1a5b-43d2-9c3f-1bf2d06d427e" providerId="ADAL" clId="{EBCF9EDA-920A-43BC-A464-6C6D16ED0581}" dt="2022-10-04T12:13:36.628" v="36" actId="20577"/>
+        <pc:sldMkLst>
+          <pc:docMk/>
+          <pc:sldMk cId="2167334292" sldId="299"/>
+        </pc:sldMkLst>
+        <pc:spChg chg="mod">
+          <ac:chgData name="Brent Pulmans" userId="8ae858ac-1a5b-43d2-9c3f-1bf2d06d427e" providerId="ADAL" clId="{EBCF9EDA-920A-43BC-A464-6C6D16ED0581}" dt="2022-10-04T12:13:36.628" v="36" actId="20577"/>
+          <ac:spMkLst>
+            <pc:docMk/>
+            <pc:sldMk cId="2167334292" sldId="299"/>
+            <ac:spMk id="3" creationId="{00000000-0000-0000-0000-000000000000}"/>
+          </ac:spMkLst>
+        </pc:spChg>
+      </pc:sldChg>
+      <pc:sldChg chg="modSp mod">
+        <pc:chgData name="Brent Pulmans" userId="8ae858ac-1a5b-43d2-9c3f-1bf2d06d427e" providerId="ADAL" clId="{EBCF9EDA-920A-43BC-A464-6C6D16ED0581}" dt="2022-10-04T11:49:57.271" v="5" actId="20577"/>
+        <pc:sldMkLst>
+          <pc:docMk/>
+          <pc:sldMk cId="1078311508" sldId="315"/>
+        </pc:sldMkLst>
+        <pc:spChg chg="mod">
+          <ac:chgData name="Brent Pulmans" userId="8ae858ac-1a5b-43d2-9c3f-1bf2d06d427e" providerId="ADAL" clId="{EBCF9EDA-920A-43BC-A464-6C6D16ED0581}" dt="2022-10-04T11:49:57.271" v="5" actId="20577"/>
+          <ac:spMkLst>
+            <pc:docMk/>
+            <pc:sldMk cId="1078311508" sldId="315"/>
+            <ac:spMk id="3" creationId="{7BE69983-0622-4C95-9CB9-CE8C332EA738}"/>
+          </ac:spMkLst>
+        </pc:spChg>
+      </pc:sldChg>
+    </pc:docChg>
+  </pc:docChgLst>
+  <pc:docChgLst>
+    <pc:chgData name="Christel Maes" userId="7e61469a-7c21-464c-bace-a1bda262211a" providerId="ADAL" clId="{D006C8EF-6211-41A2-9FC9-4DFCB4561B9B}"/>
+    <pc:docChg chg="custSel addSld modSld">
+      <pc:chgData name="Christel Maes" userId="7e61469a-7c21-464c-bace-a1bda262211a" providerId="ADAL" clId="{D006C8EF-6211-41A2-9FC9-4DFCB4561B9B}" dt="2020-03-26T13:20:00.718" v="194" actId="14100"/>
+      <pc:docMkLst>
+        <pc:docMk/>
+      </pc:docMkLst>
+      <pc:sldChg chg="addSp delSp modSp add">
+        <pc:chgData name="Christel Maes" userId="7e61469a-7c21-464c-bace-a1bda262211a" providerId="ADAL" clId="{D006C8EF-6211-41A2-9FC9-4DFCB4561B9B}" dt="2020-03-26T13:20:00.718" v="194" actId="14100"/>
+        <pc:sldMkLst>
+          <pc:docMk/>
+          <pc:sldMk cId="1205063951" sldId="316"/>
+        </pc:sldMkLst>
+        <pc:spChg chg="mod">
+          <ac:chgData name="Christel Maes" userId="7e61469a-7c21-464c-bace-a1bda262211a" providerId="ADAL" clId="{D006C8EF-6211-41A2-9FC9-4DFCB4561B9B}" dt="2020-03-26T13:04:57.403" v="77" actId="20577"/>
+          <ac:spMkLst>
+            <pc:docMk/>
+            <pc:sldMk cId="1205063951" sldId="316"/>
+            <ac:spMk id="2" creationId="{3AA6CEC6-2158-4E2D-AAAB-5F0AFB2A0592}"/>
+          </ac:spMkLst>
+        </pc:spChg>
+        <pc:spChg chg="mod">
+          <ac:chgData name="Christel Maes" userId="7e61469a-7c21-464c-bace-a1bda262211a" providerId="ADAL" clId="{D006C8EF-6211-41A2-9FC9-4DFCB4561B9B}" dt="2020-03-26T13:19:39.953" v="190" actId="20577"/>
+          <ac:spMkLst>
+            <pc:docMk/>
+            <pc:sldMk cId="1205063951" sldId="316"/>
+            <ac:spMk id="3" creationId="{866D395F-6B0D-46EB-9A83-008C409555E5}"/>
+          </ac:spMkLst>
+        </pc:spChg>
+        <pc:spChg chg="del">
+          <ac:chgData name="Christel Maes" userId="7e61469a-7c21-464c-bace-a1bda262211a" providerId="ADAL" clId="{D006C8EF-6211-41A2-9FC9-4DFCB4561B9B}" dt="2020-03-26T13:16:39.399" v="167" actId="478"/>
+          <ac:spMkLst>
+            <pc:docMk/>
+            <pc:sldMk cId="1205063951" sldId="316"/>
+            <ac:spMk id="7" creationId="{79E203A8-5189-4907-A17E-8E0F73D3513E}"/>
+          </ac:spMkLst>
+        </pc:spChg>
+        <pc:spChg chg="mod">
+          <ac:chgData name="Christel Maes" userId="7e61469a-7c21-464c-bace-a1bda262211a" providerId="ADAL" clId="{D006C8EF-6211-41A2-9FC9-4DFCB4561B9B}" dt="2020-03-26T13:20:00.718" v="194" actId="14100"/>
+          <ac:spMkLst>
+            <pc:docMk/>
+            <pc:sldMk cId="1205063951" sldId="316"/>
+            <ac:spMk id="8" creationId="{75551830-0E52-4E1E-9705-F6515D105745}"/>
+          </ac:spMkLst>
+        </pc:spChg>
+        <pc:spChg chg="add mod">
+          <ac:chgData name="Christel Maes" userId="7e61469a-7c21-464c-bace-a1bda262211a" providerId="ADAL" clId="{D006C8EF-6211-41A2-9FC9-4DFCB4561B9B}" dt="2020-03-26T13:18:36.772" v="179" actId="255"/>
+          <ac:spMkLst>
+            <pc:docMk/>
+            <pc:sldMk cId="1205063951" sldId="316"/>
+            <ac:spMk id="9" creationId="{557AD780-3082-4C32-A5C2-EC367696A85C}"/>
+          </ac:spMkLst>
+        </pc:spChg>
+        <pc:spChg chg="mod">
+          <ac:chgData name="Christel Maes" userId="7e61469a-7c21-464c-bace-a1bda262211a" providerId="ADAL" clId="{D006C8EF-6211-41A2-9FC9-4DFCB4561B9B}" dt="2020-03-26T13:19:49.692" v="191" actId="14100"/>
+          <ac:spMkLst>
+            <pc:docMk/>
+            <pc:sldMk cId="1205063951" sldId="316"/>
+            <ac:spMk id="10" creationId="{E9B81CEE-9939-4830-B526-669A21C076A7}"/>
+          </ac:spMkLst>
+        </pc:spChg>
+        <pc:spChg chg="mod">
+          <ac:chgData name="Christel Maes" userId="7e61469a-7c21-464c-bace-a1bda262211a" providerId="ADAL" clId="{D006C8EF-6211-41A2-9FC9-4DFCB4561B9B}" dt="2020-03-26T13:18:52.845" v="182" actId="14100"/>
+          <ac:spMkLst>
+            <pc:docMk/>
+            <pc:sldMk cId="1205063951" sldId="316"/>
+            <ac:spMk id="11" creationId="{D28ADD64-602C-4830-9C08-797D042F2532}"/>
+          </ac:spMkLst>
+        </pc:spChg>
+        <pc:spChg chg="mod">
+          <ac:chgData name="Christel Maes" userId="7e61469a-7c21-464c-bace-a1bda262211a" providerId="ADAL" clId="{D006C8EF-6211-41A2-9FC9-4DFCB4561B9B}" dt="2020-03-26T13:19:23.174" v="185" actId="14100"/>
+          <ac:spMkLst>
+            <pc:docMk/>
+            <pc:sldMk cId="1205063951" sldId="316"/>
+            <ac:spMk id="12" creationId="{B3335AFC-9B00-4C5F-A059-7BBEB767E7E1}"/>
+          </ac:spMkLst>
+        </pc:spChg>
+        <pc:spChg chg="mod">
+          <ac:chgData name="Christel Maes" userId="7e61469a-7c21-464c-bace-a1bda262211a" providerId="ADAL" clId="{D006C8EF-6211-41A2-9FC9-4DFCB4561B9B}" dt="2020-03-26T13:19:27.121" v="189" actId="14100"/>
+          <ac:spMkLst>
+            <pc:docMk/>
+            <pc:sldMk cId="1205063951" sldId="316"/>
+            <ac:spMk id="13" creationId="{9BBFDF69-1E9E-4497-B72C-3383A9CFDF53}"/>
+          </ac:spMkLst>
+        </pc:spChg>
         <pc:picChg chg="del">
-          <ac:chgData name="Ellen Torfs" userId="c6aa1e10-4a12-4511-8c7c-135720d4f277" providerId="ADAL" clId="{E4105CDD-61A8-4CD5-A206-FD70DE250DC6}" dt="2021-09-06T11:46:26.302" v="0" actId="478"/>
+          <ac:chgData name="Christel Maes" userId="7e61469a-7c21-464c-bace-a1bda262211a" providerId="ADAL" clId="{D006C8EF-6211-41A2-9FC9-4DFCB4561B9B}" dt="2020-03-26T13:16:06.942" v="151" actId="478"/>
           <ac:picMkLst>
             <pc:docMk/>
-            <pc:sldMk cId="2708364635" sldId="276"/>
-            <ac:picMk id="4" creationId="{44A795A1-52BF-4B85-BE19-FCA3053FDB32}"/>
+            <pc:sldMk cId="1205063951" sldId="316"/>
+            <ac:picMk id="5" creationId="{45F7716C-F5B6-4512-A926-95B861ED7EBD}"/>
           </ac:picMkLst>
         </pc:picChg>
-        <pc:picChg chg="add mod">
-          <ac:chgData name="Ellen Torfs" userId="c6aa1e10-4a12-4511-8c7c-135720d4f277" providerId="ADAL" clId="{E4105CDD-61A8-4CD5-A206-FD70DE250DC6}" dt="2021-09-06T11:46:51.654" v="4" actId="1076"/>
+        <pc:picChg chg="add mod ord">
+          <ac:chgData name="Christel Maes" userId="7e61469a-7c21-464c-bace-a1bda262211a" providerId="ADAL" clId="{D006C8EF-6211-41A2-9FC9-4DFCB4561B9B}" dt="2020-03-26T13:16:28.063" v="166" actId="1038"/>
           <ac:picMkLst>
             <pc:docMk/>
-            <pc:sldMk cId="2708364635" sldId="276"/>
-            <ac:picMk id="7" creationId="{8B6F94DA-AA0E-4229-8730-F1389E7C669E}"/>
+            <pc:sldMk cId="1205063951" sldId="316"/>
+            <ac:picMk id="6" creationId="{13A58B88-4F2D-4C49-B662-2E401EAAF241}"/>
           </ac:picMkLst>
         </pc:picChg>
       </pc:sldChg>
@@ -4623,7 +4684,7 @@
           <a:p>
             <a:fld id="{15E4F5CE-CB34-4A0C-9595-867A2C0DB20E}" type="datetimeFigureOut">
               <a:rPr lang="nl-BE" smtClean="0"/>
-              <a:t>2/06/2022</a:t>
+              <a:t>4/10/2022</a:t>
             </a:fld>
             <a:endParaRPr lang="nl-BE"/>
           </a:p>
@@ -4800,7 +4861,7 @@
           <a:p>
             <a:fld id="{4D53584B-980D-4F7D-BA36-682FCDF648BB}" type="datetimeFigureOut">
               <a:rPr lang="nl-BE" smtClean="0"/>
-              <a:t>2/06/2022</a:t>
+              <a:t>4/10/2022</a:t>
             </a:fld>
             <a:endParaRPr lang="nl-BE"/>
           </a:p>
@@ -5996,7 +6057,7 @@
           <a:p>
             <a:fld id="{F456E141-11F1-487F-A892-18B8A63336C7}" type="datetime1">
               <a:rPr lang="nl-BE" smtClean="0"/>
-              <a:t>2/06/2022</a:t>
+              <a:t>4/10/2022</a:t>
             </a:fld>
             <a:endParaRPr lang="nl-BE"/>
           </a:p>
@@ -6248,7 +6309,7 @@
           <a:p>
             <a:fld id="{85CAFD92-94F2-4CD0-8A1D-AA3295115CEC}" type="datetime1">
               <a:rPr lang="nl-BE" smtClean="0"/>
-              <a:t>2/06/2022</a:t>
+              <a:t>4/10/2022</a:t>
             </a:fld>
             <a:endParaRPr lang="nl-BE"/>
           </a:p>
@@ -6428,7 +6489,7 @@
           <a:p>
             <a:fld id="{02B84EFA-B363-4043-A12E-44B39EC7D05B}" type="datetime1">
               <a:rPr lang="nl-BE" smtClean="0"/>
-              <a:t>2/06/2022</a:t>
+              <a:t>4/10/2022</a:t>
             </a:fld>
             <a:endParaRPr lang="nl-BE"/>
           </a:p>
@@ -6627,7 +6688,7 @@
           <a:p>
             <a:fld id="{B7AA89A6-C9B9-4556-BC9E-5E3CF3322A33}" type="datetime1">
               <a:rPr lang="nl-BE" smtClean="0"/>
-              <a:t>2/06/2022</a:t>
+              <a:t>4/10/2022</a:t>
             </a:fld>
             <a:endParaRPr lang="nl-BE"/>
           </a:p>
@@ -6878,7 +6939,7 @@
           <a:p>
             <a:fld id="{6CEB42D4-4FBB-465F-AE58-8ADBDBF671C8}" type="datetime1">
               <a:rPr lang="nl-BE" smtClean="0"/>
-              <a:t>2/06/2022</a:t>
+              <a:t>4/10/2022</a:t>
             </a:fld>
             <a:endParaRPr lang="nl-BE"/>
           </a:p>
@@ -7110,7 +7171,7 @@
           <a:p>
             <a:fld id="{64B405D5-C0FD-42E0-9EB1-2670F471B7BB}" type="datetime1">
               <a:rPr lang="nl-BE" smtClean="0"/>
-              <a:t>2/06/2022</a:t>
+              <a:t>4/10/2022</a:t>
             </a:fld>
             <a:endParaRPr lang="nl-BE"/>
           </a:p>
@@ -7477,7 +7538,7 @@
           <a:p>
             <a:fld id="{4CB55C39-C031-448F-A58F-CA88F7B6F786}" type="datetime1">
               <a:rPr lang="nl-BE" smtClean="0"/>
-              <a:t>2/06/2022</a:t>
+              <a:t>4/10/2022</a:t>
             </a:fld>
             <a:endParaRPr lang="nl-BE"/>
           </a:p>
@@ -7595,7 +7656,7 @@
           <a:p>
             <a:fld id="{E29307F5-1DF0-4FFF-91A4-1E1A6A26A94A}" type="datetime1">
               <a:rPr lang="nl-BE" smtClean="0"/>
-              <a:t>2/06/2022</a:t>
+              <a:t>4/10/2022</a:t>
             </a:fld>
             <a:endParaRPr lang="nl-BE"/>
           </a:p>
@@ -7690,7 +7751,7 @@
           <a:p>
             <a:fld id="{00A9168B-A159-4E9D-A6C6-C6786C6AB2EB}" type="datetime1">
               <a:rPr lang="nl-BE" smtClean="0"/>
-              <a:t>2/06/2022</a:t>
+              <a:t>4/10/2022</a:t>
             </a:fld>
             <a:endParaRPr lang="nl-BE"/>
           </a:p>
@@ -7967,7 +8028,7 @@
           <a:p>
             <a:fld id="{E9D22159-AF82-4D23-BC06-D4277BDD9BAD}" type="datetime1">
               <a:rPr lang="nl-BE" smtClean="0"/>
-              <a:t>2/06/2022</a:t>
+              <a:t>4/10/2022</a:t>
             </a:fld>
             <a:endParaRPr lang="nl-BE"/>
           </a:p>
@@ -8220,7 +8281,7 @@
           <a:p>
             <a:fld id="{D08A7014-C292-4E4F-926C-1A31F538B52A}" type="datetime1">
               <a:rPr lang="nl-BE" smtClean="0"/>
-              <a:t>2/06/2022</a:t>
+              <a:t>4/10/2022</a:t>
             </a:fld>
             <a:endParaRPr lang="nl-BE"/>
           </a:p>
@@ -8433,7 +8494,7 @@
           <a:p>
             <a:fld id="{E9CC7161-F687-474C-905A-3CCBBA535086}" type="datetime1">
               <a:rPr lang="nl-BE" smtClean="0"/>
-              <a:t>2/06/2022</a:t>
+              <a:t>4/10/2022</a:t>
             </a:fld>
             <a:endParaRPr lang="nl-BE"/>
           </a:p>
@@ -17124,59 +17185,90 @@
           <a:lstStyle/>
           <a:p>
             <a:r>
-              <a:rPr lang="nl-BE"/>
+              <a:rPr lang="nl-BE" dirty="0"/>
               <a:t>Back in time...</a:t>
             </a:r>
           </a:p>
           <a:p>
             <a:r>
-              <a:rPr lang="nl-BE"/>
-              <a:t>Why Python?</a:t>
-            </a:r>
-          </a:p>
-          <a:p>
-            <a:r>
-              <a:rPr lang="nl-BE"/>
-              <a:t>The concept of sequence</a:t>
-            </a:r>
-          </a:p>
-          <a:p>
-            <a:r>
-              <a:rPr lang="nl-BE"/>
-              <a:t>Getting to know </a:t>
-            </a:r>
-            <a:r>
-              <a:rPr lang="nl-BE" err="1"/>
-              <a:t>PyCharm</a:t>
-            </a:r>
-            <a:endParaRPr lang="nl-BE"/>
-          </a:p>
-          <a:p>
-            <a:r>
-              <a:rPr lang="nl-BE"/>
-              <a:t>Variables and their data type</a:t>
-            </a:r>
-          </a:p>
-          <a:p>
-            <a:r>
-              <a:rPr lang="nl-BE"/>
-              <a:t>Conversion functions</a:t>
-            </a:r>
-          </a:p>
-          <a:p>
-            <a:r>
-              <a:rPr lang="nl-BE"/>
+              <a:rPr lang="nl-BE" dirty="0" err="1"/>
+              <a:t>Why</a:t>
+            </a:r>
+            <a:r>
+              <a:rPr lang="nl-BE" dirty="0"/>
+              <a:t> Python?</a:t>
+            </a:r>
+          </a:p>
+          <a:p>
+            <a:r>
+              <a:rPr lang="nl-BE" dirty="0"/>
+              <a:t>The concept of </a:t>
+            </a:r>
+            <a:r>
+              <a:rPr lang="nl-BE" dirty="0" err="1"/>
+              <a:t>sequence</a:t>
+            </a:r>
+            <a:endParaRPr lang="nl-BE" dirty="0"/>
+          </a:p>
+          <a:p>
+            <a:r>
+              <a:rPr lang="nl-BE" dirty="0"/>
+              <a:t>Variables </a:t>
+            </a:r>
+            <a:r>
+              <a:rPr lang="nl-BE" dirty="0" err="1"/>
+              <a:t>and</a:t>
+            </a:r>
+            <a:r>
+              <a:rPr lang="nl-BE" dirty="0"/>
+              <a:t> </a:t>
+            </a:r>
+            <a:r>
+              <a:rPr lang="nl-BE" dirty="0" err="1"/>
+              <a:t>their</a:t>
+            </a:r>
+            <a:r>
+              <a:rPr lang="nl-BE" dirty="0"/>
+              <a:t> data type</a:t>
+            </a:r>
+          </a:p>
+          <a:p>
+            <a:r>
+              <a:rPr lang="nl-BE" dirty="0"/>
+              <a:t>Conversion </a:t>
+            </a:r>
+            <a:r>
+              <a:rPr lang="nl-BE" dirty="0" err="1"/>
+              <a:t>functions</a:t>
+            </a:r>
+            <a:endParaRPr lang="nl-BE" dirty="0"/>
+          </a:p>
+          <a:p>
+            <a:r>
+              <a:rPr lang="nl-BE" dirty="0"/>
               <a:t>Operators</a:t>
             </a:r>
           </a:p>
           <a:p>
             <a:r>
-              <a:rPr lang="nl-BE"/>
-              <a:t>Functions print() and input()</a:t>
-            </a:r>
-          </a:p>
-          <a:p>
-            <a:endParaRPr lang="nl-BE"/>
+              <a:rPr lang="nl-BE" dirty="0" err="1"/>
+              <a:t>Functions</a:t>
+            </a:r>
+            <a:r>
+              <a:rPr lang="nl-BE" dirty="0"/>
+              <a:t> print() </a:t>
+            </a:r>
+            <a:r>
+              <a:rPr lang="nl-BE" dirty="0" err="1"/>
+              <a:t>and</a:t>
+            </a:r>
+            <a:r>
+              <a:rPr lang="nl-BE" dirty="0"/>
+              <a:t> input()</a:t>
+            </a:r>
+          </a:p>
+          <a:p>
+            <a:endParaRPr lang="nl-BE" dirty="0"/>
           </a:p>
         </p:txBody>
       </p:sp>
@@ -18681,8 +18773,12 @@
           <a:lstStyle/>
           <a:p>
             <a:r>
-              <a:rPr lang="nl-BE"/>
-              <a:t>Arithmetic operators</a:t>
+              <a:rPr lang="nl-BE" dirty="0" err="1"/>
+              <a:t>Arithmetic</a:t>
+            </a:r>
+            <a:r>
+              <a:rPr lang="nl-BE" dirty="0"/>
+              <a:t> operators</a:t>
             </a:r>
           </a:p>
         </p:txBody>
@@ -23078,40 +23174,122 @@
           <a:lstStyle/>
           <a:p>
             <a:r>
-              <a:rPr lang="nl-BE"/>
-              <a:t>Calculate the capacity per hour of the Python roller coaster in the Efteling at maximum occupancy.</a:t>
+              <a:rPr lang="nl-BE" dirty="0" err="1"/>
+              <a:t>Calculate</a:t>
+            </a:r>
+            <a:r>
+              <a:rPr lang="nl-BE" dirty="0"/>
+              <a:t> </a:t>
+            </a:r>
+            <a:r>
+              <a:rPr lang="nl-BE" dirty="0" err="1"/>
+              <a:t>the</a:t>
+            </a:r>
+            <a:r>
+              <a:rPr lang="nl-BE" dirty="0"/>
+              <a:t> </a:t>
+            </a:r>
+            <a:r>
+              <a:rPr lang="nl-BE" dirty="0" err="1"/>
+              <a:t>capacity</a:t>
+            </a:r>
+            <a:r>
+              <a:rPr lang="nl-BE" dirty="0"/>
+              <a:t> per </a:t>
+            </a:r>
+            <a:r>
+              <a:rPr lang="nl-BE" dirty="0" err="1"/>
+              <a:t>hour</a:t>
+            </a:r>
+            <a:r>
+              <a:rPr lang="nl-BE" dirty="0"/>
+              <a:t> of </a:t>
+            </a:r>
+            <a:r>
+              <a:rPr lang="nl-BE" dirty="0" err="1"/>
+              <a:t>the</a:t>
+            </a:r>
+            <a:r>
+              <a:rPr lang="nl-BE" dirty="0"/>
+              <a:t> Python roller coaster in </a:t>
+            </a:r>
+            <a:r>
+              <a:rPr lang="nl-BE" dirty="0" err="1"/>
+              <a:t>the</a:t>
+            </a:r>
+            <a:r>
+              <a:rPr lang="nl-BE" dirty="0"/>
+              <a:t> Efteling at maximum </a:t>
+            </a:r>
+            <a:r>
+              <a:rPr lang="nl-BE" dirty="0" err="1"/>
+              <a:t>occupancy</a:t>
+            </a:r>
+            <a:r>
+              <a:rPr lang="nl-BE" dirty="0"/>
+              <a:t>.</a:t>
             </a:r>
             <a:br>
-              <a:rPr lang="nl-BE"/>
+              <a:rPr lang="nl-BE" dirty="0"/>
             </a:br>
-            <a:endParaRPr lang="nl-BE"/>
+            <a:endParaRPr lang="nl-BE" dirty="0"/>
           </a:p>
           <a:p>
             <a:pPr lvl="1"/>
             <a:r>
-              <a:rPr lang="nl-BE"/>
-              <a:t>2 trains</a:t>
-            </a:r>
+              <a:rPr lang="nl-BE" dirty="0"/>
+              <a:t>2 </a:t>
+            </a:r>
+            <a:r>
+              <a:rPr lang="nl-BE" dirty="0" err="1"/>
+              <a:t>trains</a:t>
+            </a:r>
+            <a:endParaRPr lang="nl-BE" dirty="0"/>
           </a:p>
           <a:p>
             <a:pPr lvl="1"/>
             <a:r>
-              <a:rPr lang="nl-BE"/>
-              <a:t>28 seats by train</a:t>
+              <a:rPr lang="nl-BE" dirty="0"/>
+              <a:t>28 </a:t>
+            </a:r>
+            <a:r>
+              <a:rPr lang="nl-BE" dirty="0" err="1"/>
+              <a:t>seats</a:t>
+            </a:r>
+            <a:r>
+              <a:rPr lang="nl-BE" dirty="0"/>
+              <a:t> per train</a:t>
             </a:r>
           </a:p>
           <a:p>
             <a:pPr lvl="1"/>
             <a:r>
-              <a:rPr lang="nl-BE"/>
-              <a:t>Boarding time = 30 seconds</a:t>
-            </a:r>
+              <a:rPr lang="nl-BE" dirty="0"/>
+              <a:t>Boarding time = 30 </a:t>
+            </a:r>
+            <a:r>
+              <a:rPr lang="nl-BE" dirty="0" err="1"/>
+              <a:t>seconds</a:t>
+            </a:r>
+            <a:endParaRPr lang="nl-BE" dirty="0"/>
           </a:p>
           <a:p>
             <a:pPr lvl="1"/>
             <a:r>
-              <a:rPr lang="nl-BE"/>
-              <a:t>Duration of the trip = 2 minutes</a:t>
+              <a:rPr lang="nl-BE" dirty="0" err="1"/>
+              <a:t>Duration</a:t>
+            </a:r>
+            <a:r>
+              <a:rPr lang="nl-BE" dirty="0"/>
+              <a:t> of </a:t>
+            </a:r>
+            <a:r>
+              <a:rPr lang="nl-BE" dirty="0" err="1"/>
+              <a:t>the</a:t>
+            </a:r>
+            <a:r>
+              <a:rPr lang="nl-BE" dirty="0"/>
+              <a:t> trip = 2 minutes</a:t>
             </a:r>
           </a:p>
         </p:txBody>
@@ -24788,44 +24966,114 @@
           <a:lstStyle/>
           <a:p>
             <a:r>
-              <a:rPr lang="nl-BE"/>
-              <a:t>Calculate the capacity per hour of the Python roller coaster in the Efteling at maximum occupancy.</a:t>
+              <a:rPr lang="nl-BE" dirty="0" err="1"/>
+              <a:t>Calculate</a:t>
+            </a:r>
+            <a:r>
+              <a:rPr lang="nl-BE" dirty="0"/>
+              <a:t> </a:t>
+            </a:r>
+            <a:r>
+              <a:rPr lang="nl-BE" dirty="0" err="1"/>
+              <a:t>the</a:t>
+            </a:r>
+            <a:r>
+              <a:rPr lang="nl-BE" dirty="0"/>
+              <a:t> </a:t>
+            </a:r>
+            <a:r>
+              <a:rPr lang="nl-BE" dirty="0" err="1"/>
+              <a:t>capacity</a:t>
+            </a:r>
+            <a:r>
+              <a:rPr lang="nl-BE" dirty="0"/>
+              <a:t> per </a:t>
+            </a:r>
+            <a:r>
+              <a:rPr lang="nl-BE" dirty="0" err="1"/>
+              <a:t>hour</a:t>
+            </a:r>
+            <a:r>
+              <a:rPr lang="nl-BE" dirty="0"/>
+              <a:t> of </a:t>
+            </a:r>
+            <a:r>
+              <a:rPr lang="nl-BE" dirty="0" err="1"/>
+              <a:t>the</a:t>
+            </a:r>
+            <a:r>
+              <a:rPr lang="nl-BE" dirty="0"/>
+              <a:t> Python roller coaster in </a:t>
+            </a:r>
+            <a:r>
+              <a:rPr lang="nl-BE" dirty="0" err="1"/>
+              <a:t>the</a:t>
+            </a:r>
+            <a:r>
+              <a:rPr lang="nl-BE" dirty="0"/>
+              <a:t> Efteling at maximum </a:t>
+            </a:r>
+            <a:r>
+              <a:rPr lang="nl-BE" dirty="0" err="1"/>
+              <a:t>occupancy</a:t>
+            </a:r>
+            <a:r>
+              <a:rPr lang="nl-BE" dirty="0"/>
+              <a:t>.</a:t>
             </a:r>
             <a:br>
-              <a:rPr lang="nl-BE"/>
+              <a:rPr lang="nl-BE" dirty="0"/>
             </a:br>
-            <a:endParaRPr lang="nl-BE"/>
+            <a:endParaRPr lang="nl-BE" dirty="0"/>
           </a:p>
           <a:p>
             <a:pPr lvl="1"/>
             <a:r>
-              <a:rPr lang="nl-BE"/>
-              <a:t>2 trains</a:t>
-            </a:r>
+              <a:rPr lang="nl-BE" dirty="0"/>
+              <a:t>2 </a:t>
+            </a:r>
+            <a:r>
+              <a:rPr lang="nl-BE" dirty="0" err="1"/>
+              <a:t>trains</a:t>
+            </a:r>
+            <a:endParaRPr lang="nl-BE" dirty="0"/>
           </a:p>
           <a:p>
             <a:pPr lvl="1"/>
             <a:r>
-              <a:rPr lang="nl-BE"/>
-              <a:t>28 seats by train</a:t>
+              <a:rPr lang="nl-BE" dirty="0"/>
+              <a:t>28 </a:t>
+            </a:r>
+            <a:r>
+              <a:rPr lang="nl-BE" dirty="0" err="1"/>
+              <a:t>seats</a:t>
+            </a:r>
+            <a:r>
+              <a:rPr lang="nl-BE" dirty="0"/>
+              <a:t> per train</a:t>
             </a:r>
           </a:p>
           <a:p>
             <a:pPr lvl="1"/>
             <a:r>
-              <a:rPr lang="nl-BE"/>
-              <a:t>Boarding time = 30 seconds</a:t>
-            </a:r>
+              <a:rPr lang="nl-BE" dirty="0"/>
+              <a:t>Boarding time = 30 </a:t>
+            </a:r>
+            <a:r>
+              <a:rPr lang="nl-BE" dirty="0" err="1"/>
+              <a:t>seconds</a:t>
+            </a:r>
+            <a:endParaRPr lang="nl-BE" dirty="0"/>
           </a:p>
           <a:p>
             <a:pPr lvl="1"/>
             <a:r>
-              <a:rPr lang="nl-BE" err="1"/>
-              <a:t>Ride time</a:t>
-            </a:r>
-            <a:r>
-              <a:rPr lang="nl-BE"/>
-              <a:t> = 2 minutes</a:t>
+              <a:rPr lang="nl-BE" dirty="0" err="1"/>
+              <a:t>Ride</a:t>
+            </a:r>
+            <a:r>
+              <a:rPr lang="nl-BE" dirty="0"/>
+              <a:t> time = 2 minutes</a:t>
             </a:r>
           </a:p>
         </p:txBody>
@@ -27656,7 +27904,7 @@
             </a:r>
             <a:r>
               <a:rPr lang="nl-BE" dirty="0"/>
-              <a:t> code &gt; Ctrl + K, Ctrl + C</a:t>
+              <a:t> code &gt; Ctrl + : (in Visual Studio Code)</a:t>
             </a:r>
             <a:endParaRPr lang="nl-BE" dirty="0">
               <a:solidFill>
@@ -27680,7 +27928,7 @@
             </a:r>
             <a:r>
               <a:rPr lang="nl-BE" dirty="0"/>
-              <a:t> code &gt; Ctrl + K, Ctrl + U</a:t>
+              <a:t> code &gt; Ctrl + :</a:t>
             </a:r>
             <a:endParaRPr lang="nl-BE" dirty="0">
               <a:solidFill>

</xml_diff>